<commit_message>
Update Project Presentation - Prasoon Sharma.pptx
</commit_message>
<xml_diff>
--- a/Project Presentation - Prasoon Sharma.pptx
+++ b/Project Presentation - Prasoon Sharma.pptx
@@ -5,7 +5,7 @@
     <p:sldMasterId id="2147483660" r:id="rId1"/>
   </p:sldMasterIdLst>
   <p:handoutMasterIdLst>
-    <p:handoutMasterId r:id="rId16"/>
+    <p:handoutMasterId r:id="rId18"/>
   </p:handoutMasterIdLst>
   <p:sldIdLst>
     <p:sldId id="265" r:id="rId2"/>
@@ -13,15 +13,17 @@
     <p:sldId id="258" r:id="rId4"/>
     <p:sldId id="259" r:id="rId5"/>
     <p:sldId id="261" r:id="rId6"/>
-    <p:sldId id="260" r:id="rId7"/>
-    <p:sldId id="266" r:id="rId8"/>
-    <p:sldId id="269" r:id="rId9"/>
-    <p:sldId id="267" r:id="rId10"/>
-    <p:sldId id="268" r:id="rId11"/>
-    <p:sldId id="270" r:id="rId12"/>
-    <p:sldId id="271" r:id="rId13"/>
-    <p:sldId id="264" r:id="rId14"/>
-    <p:sldId id="263" r:id="rId15"/>
+    <p:sldId id="273" r:id="rId7"/>
+    <p:sldId id="260" r:id="rId8"/>
+    <p:sldId id="266" r:id="rId9"/>
+    <p:sldId id="269" r:id="rId10"/>
+    <p:sldId id="267" r:id="rId11"/>
+    <p:sldId id="268" r:id="rId12"/>
+    <p:sldId id="270" r:id="rId13"/>
+    <p:sldId id="272" r:id="rId14"/>
+    <p:sldId id="271" r:id="rId15"/>
+    <p:sldId id="264" r:id="rId16"/>
+    <p:sldId id="263" r:id="rId17"/>
   </p:sldIdLst>
   <p:sldSz cx="12192000" cy="6858000"/>
   <p:notesSz cx="6858000" cy="9144000"/>
@@ -124,6 +126,9 @@
     <p:ext uri="{EFAFB233-063F-42B5-8137-9DF3F51BA10A}">
       <p15:sldGuideLst xmlns:p15="http://schemas.microsoft.com/office/powerpoint/2012/main"/>
     </p:ext>
+    <p:ext uri="{2D200454-40CA-4A62-9FC3-DE9A4176ACB9}">
+      <p15:notesGuideLst xmlns:p15="http://schemas.microsoft.com/office/powerpoint/2012/main"/>
+    </p:ext>
   </p:extLst>
 </p:presentation>
 </file>
@@ -3587,7 +3592,7 @@
             <a:defRPr cap="all"/>
           </a:pPr>
           <a:r>
-            <a:rPr lang="en-US"/>
+            <a:rPr lang="en-US" dirty="0"/>
             <a:t>Percentage of movies contribution as per genre</a:t>
           </a:r>
         </a:p>
@@ -5499,7 +5504,7 @@
             <a:defRPr cap="all"/>
           </a:pPr>
           <a:r>
-            <a:rPr lang="en-US" sz="1500" kern="1200"/>
+            <a:rPr lang="en-US" sz="1500" kern="1200" dirty="0"/>
             <a:t>Percentage of movies contribution as per genre</a:t>
           </a:r>
         </a:p>
@@ -12405,7 +12410,7 @@
           <a:p>
             <a:fld id="{FC0AD9F0-E4E3-40A2-8BA0-EF8D5C638C66}" type="datetimeFigureOut">
               <a:rPr lang="en-IN" smtClean="0"/>
-              <a:t>13-10-2020</a:t>
+              <a:t>14-10-2020</a:t>
             </a:fld>
             <a:endParaRPr lang="en-IN"/>
           </a:p>
@@ -12631,7 +12636,7 @@
           <a:p>
             <a:fld id="{A8553C67-CBBB-4AFC-851B-839A699482F9}" type="datetimeFigureOut">
               <a:rPr lang="en-IN" smtClean="0"/>
-              <a:t>13-10-2020</a:t>
+              <a:t>14-10-2020</a:t>
             </a:fld>
             <a:endParaRPr lang="en-IN" dirty="0"/>
           </a:p>
@@ -12801,7 +12806,7 @@
           <a:p>
             <a:fld id="{A8553C67-CBBB-4AFC-851B-839A699482F9}" type="datetimeFigureOut">
               <a:rPr lang="en-IN" smtClean="0"/>
-              <a:t>13-10-2020</a:t>
+              <a:t>14-10-2020</a:t>
             </a:fld>
             <a:endParaRPr lang="en-IN" dirty="0"/>
           </a:p>
@@ -12981,7 +12986,7 @@
           <a:p>
             <a:fld id="{A8553C67-CBBB-4AFC-851B-839A699482F9}" type="datetimeFigureOut">
               <a:rPr lang="en-IN" smtClean="0"/>
-              <a:t>13-10-2020</a:t>
+              <a:t>14-10-2020</a:t>
             </a:fld>
             <a:endParaRPr lang="en-IN" dirty="0"/>
           </a:p>
@@ -13151,7 +13156,7 @@
           <a:p>
             <a:fld id="{A8553C67-CBBB-4AFC-851B-839A699482F9}" type="datetimeFigureOut">
               <a:rPr lang="en-IN" smtClean="0"/>
-              <a:t>13-10-2020</a:t>
+              <a:t>14-10-2020</a:t>
             </a:fld>
             <a:endParaRPr lang="en-IN" dirty="0"/>
           </a:p>
@@ -13397,7 +13402,7 @@
           <a:p>
             <a:fld id="{A8553C67-CBBB-4AFC-851B-839A699482F9}" type="datetimeFigureOut">
               <a:rPr lang="en-IN" smtClean="0"/>
-              <a:t>13-10-2020</a:t>
+              <a:t>14-10-2020</a:t>
             </a:fld>
             <a:endParaRPr lang="en-IN" dirty="0"/>
           </a:p>
@@ -13629,7 +13634,7 @@
           <a:p>
             <a:fld id="{A8553C67-CBBB-4AFC-851B-839A699482F9}" type="datetimeFigureOut">
               <a:rPr lang="en-IN" smtClean="0"/>
-              <a:t>13-10-2020</a:t>
+              <a:t>14-10-2020</a:t>
             </a:fld>
             <a:endParaRPr lang="en-IN" dirty="0"/>
           </a:p>
@@ -13996,7 +14001,7 @@
           <a:p>
             <a:fld id="{A8553C67-CBBB-4AFC-851B-839A699482F9}" type="datetimeFigureOut">
               <a:rPr lang="en-IN" smtClean="0"/>
-              <a:t>13-10-2020</a:t>
+              <a:t>14-10-2020</a:t>
             </a:fld>
             <a:endParaRPr lang="en-IN" dirty="0"/>
           </a:p>
@@ -14114,7 +14119,7 @@
           <a:p>
             <a:fld id="{A8553C67-CBBB-4AFC-851B-839A699482F9}" type="datetimeFigureOut">
               <a:rPr lang="en-IN" smtClean="0"/>
-              <a:t>13-10-2020</a:t>
+              <a:t>14-10-2020</a:t>
             </a:fld>
             <a:endParaRPr lang="en-IN" dirty="0"/>
           </a:p>
@@ -14209,7 +14214,7 @@
           <a:p>
             <a:fld id="{A8553C67-CBBB-4AFC-851B-839A699482F9}" type="datetimeFigureOut">
               <a:rPr lang="en-IN" smtClean="0"/>
-              <a:t>13-10-2020</a:t>
+              <a:t>14-10-2020</a:t>
             </a:fld>
             <a:endParaRPr lang="en-IN" dirty="0"/>
           </a:p>
@@ -14486,7 +14491,7 @@
           <a:p>
             <a:fld id="{A8553C67-CBBB-4AFC-851B-839A699482F9}" type="datetimeFigureOut">
               <a:rPr lang="en-IN" smtClean="0"/>
-              <a:t>13-10-2020</a:t>
+              <a:t>14-10-2020</a:t>
             </a:fld>
             <a:endParaRPr lang="en-IN" dirty="0"/>
           </a:p>
@@ -14742,7 +14747,7 @@
           <a:p>
             <a:fld id="{A8553C67-CBBB-4AFC-851B-839A699482F9}" type="datetimeFigureOut">
               <a:rPr lang="en-IN" smtClean="0"/>
-              <a:t>13-10-2020</a:t>
+              <a:t>14-10-2020</a:t>
             </a:fld>
             <a:endParaRPr lang="en-IN" dirty="0"/>
           </a:p>
@@ -14955,7 +14960,7 @@
           <a:p>
             <a:fld id="{A8553C67-CBBB-4AFC-851B-839A699482F9}" type="datetimeFigureOut">
               <a:rPr lang="en-IN" smtClean="0"/>
-              <a:t>13-10-2020</a:t>
+              <a:t>14-10-2020</a:t>
             </a:fld>
             <a:endParaRPr lang="en-IN" dirty="0"/>
           </a:p>
@@ -15962,6 +15967,558 @@
       </p:grpSpPr>
       <p:sp useBgFill="1">
         <p:nvSpPr>
+          <p:cNvPr id="33" name="Rectangle 25">
+            <a:extLst>
+              <a:ext uri="{FF2B5EF4-FFF2-40B4-BE49-F238E27FC236}">
+                <a16:creationId xmlns:a16="http://schemas.microsoft.com/office/drawing/2014/main" id="{201CC55D-ED54-4C5C-95E6-10947BD1103B}"/>
+              </a:ext>
+              <a:ext uri="{C183D7F6-B498-43B3-948B-1728B52AA6E4}">
+                <adec:decorative xmlns:adec="http://schemas.microsoft.com/office/drawing/2017/decorative" val="1"/>
+              </a:ext>
+            </a:extLst>
+          </p:cNvPr>
+          <p:cNvSpPr>
+            <a:spLocks noGrp="1" noRot="1" noChangeAspect="1" noMove="1" noResize="1" noEditPoints="1" noAdjustHandles="1" noChangeArrowheads="1" noChangeShapeType="1" noTextEdit="1"/>
+          </p:cNvSpPr>
+          <p:nvPr>
+            <p:extLst>
+              <p:ext uri="{386F3935-93C4-4BCD-93E2-E3B085C9AB24}">
+                <p16:designElem xmlns:p16="http://schemas.microsoft.com/office/powerpoint/2015/main" val="1"/>
+              </p:ext>
+            </p:extLst>
+          </p:nvPr>
+        </p:nvSpPr>
+        <p:spPr>
+          <a:xfrm>
+            <a:off x="0" y="0"/>
+            <a:ext cx="12191999" cy="6857365"/>
+          </a:xfrm>
+          <a:prstGeom prst="rect">
+            <a:avLst/>
+          </a:prstGeom>
+          <a:ln>
+            <a:noFill/>
+          </a:ln>
+        </p:spPr>
+        <p:style>
+          <a:lnRef idx="2">
+            <a:schemeClr val="accent1">
+              <a:shade val="50000"/>
+            </a:schemeClr>
+          </a:lnRef>
+          <a:fillRef idx="1">
+            <a:schemeClr val="accent1"/>
+          </a:fillRef>
+          <a:effectRef idx="0">
+            <a:schemeClr val="accent1"/>
+          </a:effectRef>
+          <a:fontRef idx="minor">
+            <a:schemeClr val="lt1"/>
+          </a:fontRef>
+        </p:style>
+        <p:txBody>
+          <a:bodyPr rtlCol="0" anchor="ctr"/>
+          <a:lstStyle/>
+          <a:p>
+            <a:pPr algn="ctr"/>
+            <a:endParaRPr lang="en-US"/>
+          </a:p>
+        </p:txBody>
+      </p:sp>
+      <p:sp>
+        <p:nvSpPr>
+          <p:cNvPr id="2" name="Title 1">
+            <a:extLst>
+              <a:ext uri="{FF2B5EF4-FFF2-40B4-BE49-F238E27FC236}">
+                <a16:creationId xmlns:a16="http://schemas.microsoft.com/office/drawing/2014/main" id="{9235B876-FF92-4568-8404-06E860A2E660}"/>
+              </a:ext>
+            </a:extLst>
+          </p:cNvPr>
+          <p:cNvSpPr>
+            <a:spLocks noGrp="1"/>
+          </p:cNvSpPr>
+          <p:nvPr>
+            <p:ph type="title"/>
+          </p:nvPr>
+        </p:nvSpPr>
+        <p:spPr>
+          <a:xfrm>
+            <a:off x="589560" y="856180"/>
+            <a:ext cx="4560584" cy="1128068"/>
+          </a:xfrm>
+        </p:spPr>
+        <p:txBody>
+          <a:bodyPr vert="horz" lIns="91440" tIns="45720" rIns="91440" bIns="45720" rtlCol="0" anchor="ctr">
+            <a:normAutofit/>
+          </a:bodyPr>
+          <a:lstStyle/>
+          <a:p>
+            <a:r>
+              <a:rPr lang="en-US" sz="4000" kern="1200" dirty="0">
+                <a:latin typeface="+mj-lt"/>
+                <a:ea typeface="+mj-ea"/>
+                <a:cs typeface="+mj-cs"/>
+              </a:rPr>
+              <a:t>Results</a:t>
+            </a:r>
+          </a:p>
+        </p:txBody>
+      </p:sp>
+      <p:grpSp>
+        <p:nvGrpSpPr>
+          <p:cNvPr id="35" name="Group 27">
+            <a:extLst>
+              <a:ext uri="{FF2B5EF4-FFF2-40B4-BE49-F238E27FC236}">
+                <a16:creationId xmlns:a16="http://schemas.microsoft.com/office/drawing/2014/main" id="{1DE889C7-FAD6-4397-98E2-05D503484459}"/>
+              </a:ext>
+              <a:ext uri="{C183D7F6-B498-43B3-948B-1728B52AA6E4}">
+                <adec:decorative xmlns:adec="http://schemas.microsoft.com/office/drawing/2017/decorative" val="1"/>
+              </a:ext>
+            </a:extLst>
+          </p:cNvPr>
+          <p:cNvGrpSpPr>
+            <a:grpSpLocks noGrp="1" noUngrp="1" noRot="1" noChangeAspect="1" noMove="1" noResize="1"/>
+          </p:cNvGrpSpPr>
+          <p:nvPr>
+            <p:extLst>
+              <p:ext uri="{386F3935-93C4-4BCD-93E2-E3B085C9AB24}">
+                <p16:designElem xmlns:p16="http://schemas.microsoft.com/office/powerpoint/2015/main" val="1"/>
+              </p:ext>
+            </p:extLst>
+          </p:nvPr>
+        </p:nvGrpSpPr>
+        <p:grpSpPr>
+          <a:xfrm>
+            <a:off x="0" y="1083484"/>
+            <a:ext cx="355196" cy="673460"/>
+            <a:chOff x="0" y="823811"/>
+            <a:chExt cx="355196" cy="673460"/>
+          </a:xfrm>
+        </p:grpSpPr>
+        <p:sp>
+          <p:nvSpPr>
+            <p:cNvPr id="29" name="Rectangle 28">
+              <a:extLst>
+                <a:ext uri="{FF2B5EF4-FFF2-40B4-BE49-F238E27FC236}">
+                  <a16:creationId xmlns:a16="http://schemas.microsoft.com/office/drawing/2014/main" id="{F399A70F-F8CD-4992-9EF5-6CF15472E73F}"/>
+                </a:ext>
+                <a:ext uri="{C183D7F6-B498-43B3-948B-1728B52AA6E4}">
+                  <adec:decorative xmlns:adec="http://schemas.microsoft.com/office/drawing/2017/decorative" val="1"/>
+                </a:ext>
+              </a:extLst>
+            </p:cNvPr>
+            <p:cNvSpPr/>
+            <p:nvPr>
+              <p:extLst>
+                <p:ext uri="{386F3935-93C4-4BCD-93E2-E3B085C9AB24}">
+                  <p16:designElem xmlns:p16="http://schemas.microsoft.com/office/powerpoint/2015/main" val="1"/>
+                </p:ext>
+              </p:extLst>
+            </p:nvPr>
+          </p:nvSpPr>
+          <p:spPr>
+            <a:xfrm>
+              <a:off x="0" y="823811"/>
+              <a:ext cx="87363" cy="673460"/>
+            </a:xfrm>
+            <a:prstGeom prst="rect">
+              <a:avLst/>
+            </a:prstGeom>
+            <a:solidFill>
+              <a:schemeClr val="accent4"/>
+            </a:solidFill>
+            <a:ln>
+              <a:noFill/>
+            </a:ln>
+          </p:spPr>
+          <p:style>
+            <a:lnRef idx="2">
+              <a:schemeClr val="accent1">
+                <a:shade val="50000"/>
+              </a:schemeClr>
+            </a:lnRef>
+            <a:fillRef idx="1">
+              <a:schemeClr val="accent1"/>
+            </a:fillRef>
+            <a:effectRef idx="0">
+              <a:schemeClr val="accent1"/>
+            </a:effectRef>
+            <a:fontRef idx="minor">
+              <a:schemeClr val="lt1"/>
+            </a:fontRef>
+          </p:style>
+          <p:txBody>
+            <a:bodyPr rtlCol="0" anchor="ctr"/>
+            <a:lstStyle/>
+            <a:p>
+              <a:pPr algn="ctr"/>
+              <a:endParaRPr lang="en-US"/>
+            </a:p>
+          </p:txBody>
+        </p:sp>
+        <p:sp>
+          <p:nvSpPr>
+            <p:cNvPr id="37" name="Rectangle 29">
+              <a:extLst>
+                <a:ext uri="{FF2B5EF4-FFF2-40B4-BE49-F238E27FC236}">
+                  <a16:creationId xmlns:a16="http://schemas.microsoft.com/office/drawing/2014/main" id="{48F4FEDC-6D80-458C-A665-075D9B9500FD}"/>
+                </a:ext>
+                <a:ext uri="{C183D7F6-B498-43B3-948B-1728B52AA6E4}">
+                  <adec:decorative xmlns:adec="http://schemas.microsoft.com/office/drawing/2017/decorative" val="1"/>
+                </a:ext>
+              </a:extLst>
+            </p:cNvPr>
+            <p:cNvSpPr/>
+            <p:nvPr>
+              <p:extLst>
+                <p:ext uri="{386F3935-93C4-4BCD-93E2-E3B085C9AB24}">
+                  <p16:designElem xmlns:p16="http://schemas.microsoft.com/office/powerpoint/2015/main" val="1"/>
+                </p:ext>
+              </p:extLst>
+            </p:nvPr>
+          </p:nvSpPr>
+          <p:spPr>
+            <a:xfrm>
+              <a:off x="159341" y="823811"/>
+              <a:ext cx="195855" cy="673460"/>
+            </a:xfrm>
+            <a:prstGeom prst="rect">
+              <a:avLst/>
+            </a:prstGeom>
+            <a:solidFill>
+              <a:schemeClr val="accent4"/>
+            </a:solidFill>
+            <a:ln>
+              <a:noFill/>
+            </a:ln>
+          </p:spPr>
+          <p:style>
+            <a:lnRef idx="2">
+              <a:schemeClr val="accent1">
+                <a:shade val="50000"/>
+              </a:schemeClr>
+            </a:lnRef>
+            <a:fillRef idx="1">
+              <a:schemeClr val="accent1"/>
+            </a:fillRef>
+            <a:effectRef idx="0">
+              <a:schemeClr val="accent1"/>
+            </a:effectRef>
+            <a:fontRef idx="minor">
+              <a:schemeClr val="lt1"/>
+            </a:fontRef>
+          </p:style>
+          <p:txBody>
+            <a:bodyPr rtlCol="0" anchor="ctr"/>
+            <a:lstStyle/>
+            <a:p>
+              <a:pPr algn="ctr"/>
+              <a:endParaRPr lang="en-US"/>
+            </a:p>
+          </p:txBody>
+        </p:sp>
+      </p:grpSp>
+      <p:sp>
+        <p:nvSpPr>
+          <p:cNvPr id="32" name="Rectangle 31">
+            <a:extLst>
+              <a:ext uri="{FF2B5EF4-FFF2-40B4-BE49-F238E27FC236}">
+                <a16:creationId xmlns:a16="http://schemas.microsoft.com/office/drawing/2014/main" id="{3873B707-463F-40B0-8227-E8CC6C67EB25}"/>
+              </a:ext>
+              <a:ext uri="{C183D7F6-B498-43B3-948B-1728B52AA6E4}">
+                <adec:decorative xmlns:adec="http://schemas.microsoft.com/office/drawing/2017/decorative" val="1"/>
+              </a:ext>
+            </a:extLst>
+          </p:cNvPr>
+          <p:cNvSpPr>
+            <a:spLocks noGrp="1" noRot="1" noChangeAspect="1" noMove="1" noResize="1" noEditPoints="1" noAdjustHandles="1" noChangeArrowheads="1" noChangeShapeType="1" noTextEdit="1"/>
+          </p:cNvSpPr>
+          <p:nvPr>
+            <p:extLst>
+              <p:ext uri="{386F3935-93C4-4BCD-93E2-E3B085C9AB24}">
+                <p16:designElem xmlns:p16="http://schemas.microsoft.com/office/powerpoint/2015/main" val="1"/>
+              </p:ext>
+            </p:extLst>
+          </p:nvPr>
+        </p:nvSpPr>
+        <p:spPr>
+          <a:xfrm flipH="1">
+            <a:off x="665085" y="2090569"/>
+            <a:ext cx="4297680" cy="27432"/>
+          </a:xfrm>
+          <a:prstGeom prst="rect">
+            <a:avLst/>
+          </a:prstGeom>
+          <a:solidFill>
+            <a:schemeClr val="accent4"/>
+          </a:solidFill>
+          <a:ln>
+            <a:noFill/>
+          </a:ln>
+        </p:spPr>
+        <p:style>
+          <a:lnRef idx="2">
+            <a:schemeClr val="accent1">
+              <a:shade val="50000"/>
+            </a:schemeClr>
+          </a:lnRef>
+          <a:fillRef idx="1">
+            <a:schemeClr val="accent1"/>
+          </a:fillRef>
+          <a:effectRef idx="0">
+            <a:schemeClr val="accent1"/>
+          </a:effectRef>
+          <a:fontRef idx="minor">
+            <a:schemeClr val="lt1"/>
+          </a:fontRef>
+        </p:style>
+        <p:txBody>
+          <a:bodyPr rtlCol="0" anchor="ctr"/>
+          <a:lstStyle/>
+          <a:p>
+            <a:pPr algn="ctr"/>
+            <a:endParaRPr lang="en-US"/>
+          </a:p>
+        </p:txBody>
+      </p:sp>
+      <p:sp>
+        <p:nvSpPr>
+          <p:cNvPr id="34" name="Rectangle 33">
+            <a:extLst>
+              <a:ext uri="{FF2B5EF4-FFF2-40B4-BE49-F238E27FC236}">
+                <a16:creationId xmlns:a16="http://schemas.microsoft.com/office/drawing/2014/main" id="{C13237C8-E62C-4F0D-A318-BD6FB6C2D138}"/>
+              </a:ext>
+              <a:ext uri="{C183D7F6-B498-43B3-948B-1728B52AA6E4}">
+                <adec:decorative xmlns:adec="http://schemas.microsoft.com/office/drawing/2017/decorative" val="1"/>
+              </a:ext>
+            </a:extLst>
+          </p:cNvPr>
+          <p:cNvSpPr>
+            <a:spLocks noGrp="1" noRot="1" noChangeAspect="1" noMove="1" noResize="1" noEditPoints="1" noAdjustHandles="1" noChangeArrowheads="1" noChangeShapeType="1" noTextEdit="1"/>
+          </p:cNvSpPr>
+          <p:nvPr>
+            <p:extLst>
+              <p:ext uri="{386F3935-93C4-4BCD-93E2-E3B085C9AB24}">
+                <p16:designElem xmlns:p16="http://schemas.microsoft.com/office/powerpoint/2015/main" val="1"/>
+              </p:ext>
+            </p:extLst>
+          </p:nvPr>
+        </p:nvSpPr>
+        <p:spPr>
+          <a:xfrm flipH="1">
+            <a:off x="10697670" y="0"/>
+            <a:ext cx="1494330" cy="6858000"/>
+          </a:xfrm>
+          <a:prstGeom prst="rect">
+            <a:avLst/>
+          </a:prstGeom>
+          <a:solidFill>
+            <a:schemeClr val="accent4"/>
+          </a:solidFill>
+          <a:ln>
+            <a:noFill/>
+          </a:ln>
+        </p:spPr>
+        <p:style>
+          <a:lnRef idx="2">
+            <a:schemeClr val="accent1">
+              <a:shade val="50000"/>
+            </a:schemeClr>
+          </a:lnRef>
+          <a:fillRef idx="1">
+            <a:schemeClr val="accent1"/>
+          </a:fillRef>
+          <a:effectRef idx="0">
+            <a:schemeClr val="accent1"/>
+          </a:effectRef>
+          <a:fontRef idx="minor">
+            <a:schemeClr val="lt1"/>
+          </a:fontRef>
+        </p:style>
+        <p:txBody>
+          <a:bodyPr rtlCol="0" anchor="ctr"/>
+          <a:lstStyle/>
+          <a:p>
+            <a:pPr algn="ctr"/>
+            <a:endParaRPr lang="en-US"/>
+          </a:p>
+        </p:txBody>
+      </p:sp>
+      <p:sp>
+        <p:nvSpPr>
+          <p:cNvPr id="36" name="Rectangle 35">
+            <a:extLst>
+              <a:ext uri="{FF2B5EF4-FFF2-40B4-BE49-F238E27FC236}">
+                <a16:creationId xmlns:a16="http://schemas.microsoft.com/office/drawing/2014/main" id="{19C9EAEA-39D0-4B0E-A0EB-51E7B26740B1}"/>
+              </a:ext>
+              <a:ext uri="{C183D7F6-B498-43B3-948B-1728B52AA6E4}">
+                <adec:decorative xmlns:adec="http://schemas.microsoft.com/office/drawing/2017/decorative" val="1"/>
+              </a:ext>
+            </a:extLst>
+          </p:cNvPr>
+          <p:cNvSpPr>
+            <a:spLocks noGrp="1" noRot="1" noChangeAspect="1" noMove="1" noResize="1" noEditPoints="1" noAdjustHandles="1" noChangeArrowheads="1" noChangeShapeType="1" noTextEdit="1"/>
+          </p:cNvSpPr>
+          <p:nvPr>
+            <p:extLst>
+              <p:ext uri="{386F3935-93C4-4BCD-93E2-E3B085C9AB24}">
+                <p16:designElem xmlns:p16="http://schemas.microsoft.com/office/powerpoint/2015/main" val="1"/>
+              </p:ext>
+            </p:extLst>
+          </p:nvPr>
+        </p:nvSpPr>
+        <p:spPr>
+          <a:xfrm>
+            <a:off x="5685810" y="513853"/>
+            <a:ext cx="6009366" cy="5834577"/>
+          </a:xfrm>
+          <a:prstGeom prst="rect">
+            <a:avLst/>
+          </a:prstGeom>
+          <a:solidFill>
+            <a:schemeClr val="bg1"/>
+          </a:solidFill>
+          <a:ln>
+            <a:noFill/>
+          </a:ln>
+          <a:effectLst>
+            <a:outerShdw blurRad="139700" dist="127000" dir="5400000" algn="t" rotWithShape="0">
+              <a:prstClr val="black">
+                <a:alpha val="15000"/>
+              </a:prstClr>
+            </a:outerShdw>
+          </a:effectLst>
+        </p:spPr>
+        <p:style>
+          <a:lnRef idx="2">
+            <a:schemeClr val="accent1">
+              <a:shade val="50000"/>
+            </a:schemeClr>
+          </a:lnRef>
+          <a:fillRef idx="1">
+            <a:schemeClr val="accent1"/>
+          </a:fillRef>
+          <a:effectRef idx="0">
+            <a:schemeClr val="accent1"/>
+          </a:effectRef>
+          <a:fontRef idx="minor">
+            <a:schemeClr val="lt1"/>
+          </a:fontRef>
+        </p:style>
+        <p:txBody>
+          <a:bodyPr rtlCol="0" anchor="ctr"/>
+          <a:lstStyle/>
+          <a:p>
+            <a:pPr algn="ctr"/>
+            <a:endParaRPr lang="en-US"/>
+          </a:p>
+        </p:txBody>
+      </p:sp>
+      <p:pic>
+        <p:nvPicPr>
+          <p:cNvPr id="8" name="Picture 7">
+            <a:extLst>
+              <a:ext uri="{FF2B5EF4-FFF2-40B4-BE49-F238E27FC236}">
+                <a16:creationId xmlns:a16="http://schemas.microsoft.com/office/drawing/2014/main" id="{6EB721CE-56DF-4744-AA7F-7D38D3D95B68}"/>
+              </a:ext>
+            </a:extLst>
+          </p:cNvPr>
+          <p:cNvPicPr/>
+          <p:nvPr/>
+        </p:nvPicPr>
+        <p:blipFill rotWithShape="1">
+          <a:blip r:embed="rId2"/>
+          <a:srcRect t="321" r="4" b="4"/>
+          <a:stretch/>
+        </p:blipFill>
+        <p:spPr>
+          <a:xfrm>
+            <a:off x="5977788" y="799352"/>
+            <a:ext cx="5425410" cy="5259296"/>
+          </a:xfrm>
+          <a:prstGeom prst="rect">
+            <a:avLst/>
+          </a:prstGeom>
+        </p:spPr>
+      </p:pic>
+      <p:sp>
+        <p:nvSpPr>
+          <p:cNvPr id="3" name="TextBox 2">
+            <a:extLst>
+              <a:ext uri="{FF2B5EF4-FFF2-40B4-BE49-F238E27FC236}">
+                <a16:creationId xmlns:a16="http://schemas.microsoft.com/office/drawing/2014/main" id="{9CA90A09-4362-4627-9576-C80B36F12989}"/>
+              </a:ext>
+            </a:extLst>
+          </p:cNvPr>
+          <p:cNvSpPr txBox="1"/>
+          <p:nvPr/>
+        </p:nvSpPr>
+        <p:spPr>
+          <a:xfrm>
+            <a:off x="665085" y="3346882"/>
+            <a:ext cx="3684973" cy="646331"/>
+          </a:xfrm>
+          <a:prstGeom prst="rect">
+            <a:avLst/>
+          </a:prstGeom>
+          <a:noFill/>
+        </p:spPr>
+        <p:txBody>
+          <a:bodyPr wrap="square" rtlCol="0">
+            <a:spAutoFit/>
+          </a:bodyPr>
+          <a:lstStyle/>
+          <a:p>
+            <a:r>
+              <a:rPr lang="en-US" dirty="0"/>
+              <a:t>Year vs Movie Count</a:t>
+            </a:r>
+          </a:p>
+          <a:p>
+            <a:endParaRPr lang="en-IN" dirty="0"/>
+          </a:p>
+        </p:txBody>
+      </p:sp>
+    </p:spTree>
+    <p:extLst>
+      <p:ext uri="{BB962C8B-B14F-4D97-AF65-F5344CB8AC3E}">
+        <p14:creationId xmlns:p14="http://schemas.microsoft.com/office/powerpoint/2010/main" val="859547858"/>
+      </p:ext>
+    </p:extLst>
+  </p:cSld>
+  <p:clrMapOvr>
+    <a:masterClrMapping/>
+  </p:clrMapOvr>
+</p:sld>
+</file>
+
+<file path=ppt/slides/slide11.xml><?xml version="1.0" encoding="utf-8"?>
+<p:sld xmlns:a="http://schemas.openxmlformats.org/drawingml/2006/main" xmlns:r="http://schemas.openxmlformats.org/officeDocument/2006/relationships" xmlns:p="http://schemas.openxmlformats.org/presentationml/2006/main">
+  <p:cSld>
+    <p:bg>
+      <p:bgPr>
+        <a:solidFill>
+          <a:schemeClr val="bg1"/>
+        </a:solidFill>
+        <a:effectLst/>
+      </p:bgPr>
+    </p:bg>
+    <p:spTree>
+      <p:nvGrpSpPr>
+        <p:cNvPr id="1" name=""/>
+        <p:cNvGrpSpPr/>
+        <p:nvPr/>
+      </p:nvGrpSpPr>
+      <p:grpSpPr>
+        <a:xfrm>
+          <a:off x="0" y="0"/>
+          <a:ext cx="0" cy="0"/>
+          <a:chOff x="0" y="0"/>
+          <a:chExt cx="0" cy="0"/>
+        </a:xfrm>
+      </p:grpSpPr>
+      <p:sp useBgFill="1">
+        <p:nvSpPr>
           <p:cNvPr id="38" name="Rectangle 37">
             <a:extLst>
               <a:ext uri="{FF2B5EF4-FFF2-40B4-BE49-F238E27FC236}">
@@ -16454,7 +17011,7 @@
 </p:sld>
 </file>
 
-<file path=ppt/slides/slide11.xml><?xml version="1.0" encoding="utf-8"?>
+<file path=ppt/slides/slide12.xml><?xml version="1.0" encoding="utf-8"?>
 <p:sld xmlns:a="http://schemas.openxmlformats.org/drawingml/2006/main" xmlns:r="http://schemas.openxmlformats.org/officeDocument/2006/relationships" xmlns:p="http://schemas.openxmlformats.org/presentationml/2006/main">
   <p:cSld>
     <p:bg>
@@ -16667,7 +17224,7 @@
           <a:lstStyle/>
           <a:p>
             <a:r>
-              <a:rPr lang="en-US" sz="2800"/>
+              <a:rPr lang="en-US" sz="2800" dirty="0"/>
               <a:t>More Results</a:t>
             </a:r>
           </a:p>
@@ -16896,7 +17453,7 @@
               <a:buChar char="•"/>
             </a:pPr>
             <a:r>
-              <a:rPr lang="en-US" sz="1700"/>
+              <a:rPr lang="en-US" sz="1700" dirty="0"/>
               <a:t>Rating vs User Votes</a:t>
             </a:r>
           </a:p>
@@ -16912,7 +17469,7 @@
               <a:buChar char="•"/>
             </a:pPr>
             <a:r>
-              <a:rPr lang="en-US" sz="1700"/>
+              <a:rPr lang="en-US" sz="1700" dirty="0"/>
               <a:t>Rating vs User Votes as per year</a:t>
             </a:r>
           </a:p>
@@ -16928,7 +17485,7 @@
               <a:buChar char="•"/>
             </a:pPr>
             <a:r>
-              <a:rPr lang="en-US" sz="1700"/>
+              <a:rPr lang="en-US" sz="1700" dirty="0"/>
               <a:t>Director vs Movie Count</a:t>
             </a:r>
           </a:p>
@@ -16944,7 +17501,7 @@
               <a:buChar char="•"/>
             </a:pPr>
             <a:r>
-              <a:rPr lang="en-US" sz="1700"/>
+              <a:rPr lang="en-US" sz="1700" dirty="0"/>
               <a:t>Genre vs Active Users </a:t>
             </a:r>
           </a:p>
@@ -16959,7 +17516,7 @@
               <a:buFont typeface="Arial" panose="020B0604020202020204" pitchFamily="34" charset="0"/>
               <a:buChar char="•"/>
             </a:pPr>
-            <a:endParaRPr lang="en-US" sz="1700"/>
+            <a:endParaRPr lang="en-US" sz="1700" dirty="0"/>
           </a:p>
           <a:p>
             <a:pPr indent="-228600" defTabSz="914400">
@@ -16972,7 +17529,7 @@
               <a:buFont typeface="Arial" panose="020B0604020202020204" pitchFamily="34" charset="0"/>
               <a:buChar char="•"/>
             </a:pPr>
-            <a:endParaRPr lang="en-US" sz="1700"/>
+            <a:endParaRPr lang="en-US" sz="1700" dirty="0"/>
           </a:p>
         </p:txBody>
       </p:sp>
@@ -16998,8 +17555,8 @@
         </p:blipFill>
         <p:spPr>
           <a:xfrm>
-            <a:off x="246888" y="3012342"/>
-            <a:ext cx="2834640" cy="2827552"/>
+            <a:off x="6424936" y="2441359"/>
+            <a:ext cx="4364392" cy="4353479"/>
           </a:xfrm>
           <a:prstGeom prst="rect">
             <a:avLst/>
@@ -17025,64 +17582,8 @@
         </p:blipFill>
         <p:spPr>
           <a:xfrm>
-            <a:off x="3200400" y="2994140"/>
-            <a:ext cx="2834640" cy="2863955"/>
-          </a:xfrm>
-          <a:prstGeom prst="rect">
-            <a:avLst/>
-          </a:prstGeom>
-        </p:spPr>
-      </p:pic>
-      <p:pic>
-        <p:nvPicPr>
-          <p:cNvPr id="4" name="Picture 3" descr="Chart, bar chart&#10;&#10;Description automatically generated">
-            <a:extLst>
-              <a:ext uri="{FF2B5EF4-FFF2-40B4-BE49-F238E27FC236}">
-                <a16:creationId xmlns:a16="http://schemas.microsoft.com/office/drawing/2014/main" id="{2AD6249F-D9E8-4914-9624-64C2B8CEE88B}"/>
-              </a:ext>
-            </a:extLst>
-          </p:cNvPr>
-          <p:cNvPicPr>
-            <a:picLocks noChangeAspect="1"/>
-          </p:cNvPicPr>
-          <p:nvPr/>
-        </p:nvPicPr>
-        <p:blipFill rotWithShape="1">
-          <a:blip r:embed="rId4"/>
-          <a:srcRect r="3991" b="-2"/>
-          <a:stretch/>
-        </p:blipFill>
-        <p:spPr>
-          <a:xfrm>
-            <a:off x="6153912" y="2994140"/>
-            <a:ext cx="2834640" cy="2863956"/>
-          </a:xfrm>
-          <a:prstGeom prst="rect">
-            <a:avLst/>
-          </a:prstGeom>
-        </p:spPr>
-      </p:pic>
-      <p:pic>
-        <p:nvPicPr>
-          <p:cNvPr id="13" name="Picture 12" descr="Chart, histogram&#10;&#10;Description automatically generated">
-            <a:extLst>
-              <a:ext uri="{FF2B5EF4-FFF2-40B4-BE49-F238E27FC236}">
-                <a16:creationId xmlns:a16="http://schemas.microsoft.com/office/drawing/2014/main" id="{9784AD5D-9DCE-432F-A069-22478062E0D9}"/>
-              </a:ext>
-            </a:extLst>
-          </p:cNvPr>
-          <p:cNvPicPr/>
-          <p:nvPr/>
-        </p:nvPicPr>
-        <p:blipFill rotWithShape="1">
-          <a:blip r:embed="rId5"/>
-          <a:srcRect l="965" r="34012" b="-3"/>
-          <a:stretch/>
-        </p:blipFill>
-        <p:spPr>
-          <a:xfrm>
-            <a:off x="9272724" y="2606462"/>
-            <a:ext cx="2504040" cy="3639312"/>
+            <a:off x="727971" y="2518975"/>
+            <a:ext cx="4232096" cy="4275863"/>
           </a:xfrm>
           <a:prstGeom prst="rect">
             <a:avLst/>
@@ -17102,7 +17603,602 @@
 </p:sld>
 </file>
 
-<file path=ppt/slides/slide12.xml><?xml version="1.0" encoding="utf-8"?>
+<file path=ppt/slides/slide13.xml><?xml version="1.0" encoding="utf-8"?>
+<p:sld xmlns:a="http://schemas.openxmlformats.org/drawingml/2006/main" xmlns:r="http://schemas.openxmlformats.org/officeDocument/2006/relationships" xmlns:p="http://schemas.openxmlformats.org/presentationml/2006/main">
+  <p:cSld>
+    <p:bg>
+      <p:bgPr>
+        <a:solidFill>
+          <a:schemeClr val="bg1"/>
+        </a:solidFill>
+        <a:effectLst/>
+      </p:bgPr>
+    </p:bg>
+    <p:spTree>
+      <p:nvGrpSpPr>
+        <p:cNvPr id="1" name=""/>
+        <p:cNvGrpSpPr/>
+        <p:nvPr/>
+      </p:nvGrpSpPr>
+      <p:grpSpPr>
+        <a:xfrm>
+          <a:off x="0" y="0"/>
+          <a:ext cx="0" cy="0"/>
+          <a:chOff x="0" y="0"/>
+          <a:chExt cx="0" cy="0"/>
+        </a:xfrm>
+      </p:grpSpPr>
+      <p:sp useBgFill="1">
+        <p:nvSpPr>
+          <p:cNvPr id="49" name="Rectangle 48">
+            <a:extLst>
+              <a:ext uri="{FF2B5EF4-FFF2-40B4-BE49-F238E27FC236}">
+                <a16:creationId xmlns:a16="http://schemas.microsoft.com/office/drawing/2014/main" id="{1F232A53-673E-406F-BB93-BF651C276DC7}"/>
+              </a:ext>
+              <a:ext uri="{C183D7F6-B498-43B3-948B-1728B52AA6E4}">
+                <adec:decorative xmlns:adec="http://schemas.microsoft.com/office/drawing/2017/decorative" val="1"/>
+              </a:ext>
+            </a:extLst>
+          </p:cNvPr>
+          <p:cNvSpPr>
+            <a:spLocks noGrp="1" noRot="1" noChangeAspect="1" noMove="1" noResize="1" noEditPoints="1" noAdjustHandles="1" noChangeArrowheads="1" noChangeShapeType="1" noTextEdit="1"/>
+          </p:cNvSpPr>
+          <p:nvPr>
+            <p:extLst>
+              <p:ext uri="{386F3935-93C4-4BCD-93E2-E3B085C9AB24}">
+                <p16:designElem xmlns:p16="http://schemas.microsoft.com/office/powerpoint/2015/main" val="1"/>
+              </p:ext>
+            </p:extLst>
+          </p:nvPr>
+        </p:nvSpPr>
+        <p:spPr>
+          <a:xfrm>
+            <a:off x="0" y="0"/>
+            <a:ext cx="12192000" cy="6858000"/>
+          </a:xfrm>
+          <a:prstGeom prst="rect">
+            <a:avLst/>
+          </a:prstGeom>
+          <a:ln>
+            <a:noFill/>
+          </a:ln>
+        </p:spPr>
+        <p:style>
+          <a:lnRef idx="2">
+            <a:schemeClr val="accent1">
+              <a:shade val="50000"/>
+            </a:schemeClr>
+          </a:lnRef>
+          <a:fillRef idx="1">
+            <a:schemeClr val="accent1"/>
+          </a:fillRef>
+          <a:effectRef idx="0">
+            <a:schemeClr val="accent1"/>
+          </a:effectRef>
+          <a:fontRef idx="minor">
+            <a:schemeClr val="lt1"/>
+          </a:fontRef>
+        </p:style>
+        <p:txBody>
+          <a:bodyPr rtlCol="0" anchor="ctr"/>
+          <a:lstStyle/>
+          <a:p>
+            <a:pPr algn="ctr"/>
+            <a:endParaRPr lang="en-US"/>
+          </a:p>
+        </p:txBody>
+      </p:sp>
+      <p:sp useBgFill="1">
+        <p:nvSpPr>
+          <p:cNvPr id="51" name="Rectangle 50">
+            <a:extLst>
+              <a:ext uri="{FF2B5EF4-FFF2-40B4-BE49-F238E27FC236}">
+                <a16:creationId xmlns:a16="http://schemas.microsoft.com/office/drawing/2014/main" id="{C062E60F-5CD4-4268-8359-8076634680E5}"/>
+              </a:ext>
+              <a:ext uri="{C183D7F6-B498-43B3-948B-1728B52AA6E4}">
+                <adec:decorative xmlns:adec="http://schemas.microsoft.com/office/drawing/2017/decorative" val="1"/>
+              </a:ext>
+            </a:extLst>
+          </p:cNvPr>
+          <p:cNvSpPr>
+            <a:spLocks noGrp="1" noRot="1" noChangeAspect="1" noMove="1" noResize="1" noEditPoints="1" noAdjustHandles="1" noChangeArrowheads="1" noChangeShapeType="1" noTextEdit="1"/>
+          </p:cNvSpPr>
+          <p:nvPr>
+            <p:extLst>
+              <p:ext uri="{386F3935-93C4-4BCD-93E2-E3B085C9AB24}">
+                <p16:designElem xmlns:p16="http://schemas.microsoft.com/office/powerpoint/2015/main" val="1"/>
+              </p:ext>
+            </p:extLst>
+          </p:nvPr>
+        </p:nvSpPr>
+        <p:spPr>
+          <a:xfrm>
+            <a:off x="554416" y="288350"/>
+            <a:ext cx="11167447" cy="2089317"/>
+          </a:xfrm>
+          <a:prstGeom prst="rect">
+            <a:avLst/>
+          </a:prstGeom>
+          <a:ln w="12700">
+            <a:solidFill>
+              <a:srgbClr val="DEDEDE"/>
+            </a:solidFill>
+          </a:ln>
+          <a:effectLst>
+            <a:outerShdw blurRad="50800" dist="38100" dir="2700000" algn="tl" rotWithShape="0">
+              <a:schemeClr val="bg2">
+                <a:lumMod val="85000"/>
+                <a:alpha val="50000"/>
+              </a:schemeClr>
+            </a:outerShdw>
+          </a:effectLst>
+        </p:spPr>
+        <p:style>
+          <a:lnRef idx="2">
+            <a:schemeClr val="accent1">
+              <a:shade val="50000"/>
+            </a:schemeClr>
+          </a:lnRef>
+          <a:fillRef idx="1">
+            <a:schemeClr val="accent1"/>
+          </a:fillRef>
+          <a:effectRef idx="0">
+            <a:schemeClr val="accent1"/>
+          </a:effectRef>
+          <a:fontRef idx="minor">
+            <a:schemeClr val="lt1"/>
+          </a:fontRef>
+        </p:style>
+        <p:txBody>
+          <a:bodyPr rtlCol="0" anchor="ctr"/>
+          <a:lstStyle/>
+          <a:p>
+            <a:pPr marL="0" marR="0" lvl="0" indent="0" algn="ctr" defTabSz="914400" rtl="0" eaLnBrk="1" fontAlgn="auto" latinLnBrk="0" hangingPunct="1">
+              <a:lnSpc>
+                <a:spcPct val="100000"/>
+              </a:lnSpc>
+              <a:spcBef>
+                <a:spcPts val="0"/>
+              </a:spcBef>
+              <a:spcAft>
+                <a:spcPts val="0"/>
+              </a:spcAft>
+              <a:buClrTx/>
+              <a:buSzTx/>
+              <a:buFontTx/>
+              <a:buNone/>
+              <a:tabLst/>
+              <a:defRPr/>
+            </a:pPr>
+            <a:endParaRPr kumimoji="0" lang="en-US" sz="1800" b="0" i="0" u="none" strike="noStrike" kern="1200" cap="none" spc="0" normalizeH="0" baseline="0" noProof="0">
+              <a:ln>
+                <a:noFill/>
+              </a:ln>
+              <a:solidFill>
+                <a:prstClr val="white"/>
+              </a:solidFill>
+              <a:effectLst/>
+              <a:uLnTx/>
+              <a:uFillTx/>
+              <a:latin typeface="Calibri" panose="020F0502020204030204"/>
+              <a:ea typeface="+mn-ea"/>
+              <a:cs typeface="+mn-cs"/>
+            </a:endParaRPr>
+          </a:p>
+        </p:txBody>
+      </p:sp>
+      <p:sp>
+        <p:nvSpPr>
+          <p:cNvPr id="2" name="Title 1">
+            <a:extLst>
+              <a:ext uri="{FF2B5EF4-FFF2-40B4-BE49-F238E27FC236}">
+                <a16:creationId xmlns:a16="http://schemas.microsoft.com/office/drawing/2014/main" id="{9235B876-FF92-4568-8404-06E860A2E660}"/>
+              </a:ext>
+            </a:extLst>
+          </p:cNvPr>
+          <p:cNvSpPr>
+            <a:spLocks noGrp="1"/>
+          </p:cNvSpPr>
+          <p:nvPr>
+            <p:ph type="title"/>
+          </p:nvPr>
+        </p:nvSpPr>
+        <p:spPr>
+          <a:xfrm>
+            <a:off x="841248" y="510047"/>
+            <a:ext cx="3300984" cy="1645920"/>
+          </a:xfrm>
+        </p:spPr>
+        <p:txBody>
+          <a:bodyPr vert="horz" lIns="91440" tIns="45720" rIns="91440" bIns="45720" rtlCol="0" anchor="ctr">
+            <a:normAutofit/>
+          </a:bodyPr>
+          <a:lstStyle/>
+          <a:p>
+            <a:r>
+              <a:rPr lang="en-US" sz="2800"/>
+              <a:t>More Results</a:t>
+            </a:r>
+            <a:endParaRPr lang="en-US" sz="2800" dirty="0"/>
+          </a:p>
+        </p:txBody>
+      </p:sp>
+      <p:sp>
+        <p:nvSpPr>
+          <p:cNvPr id="53" name="Rectangle 52">
+            <a:extLst>
+              <a:ext uri="{FF2B5EF4-FFF2-40B4-BE49-F238E27FC236}">
+                <a16:creationId xmlns:a16="http://schemas.microsoft.com/office/drawing/2014/main" id="{BB341EC3-1810-4D33-BA3F-E2D0AA0ECFB6}"/>
+              </a:ext>
+              <a:ext uri="{C183D7F6-B498-43B3-948B-1728B52AA6E4}">
+                <adec:decorative xmlns:adec="http://schemas.microsoft.com/office/drawing/2017/decorative" val="1"/>
+              </a:ext>
+            </a:extLst>
+          </p:cNvPr>
+          <p:cNvSpPr>
+            <a:spLocks noGrp="1" noRot="1" noChangeAspect="1" noMove="1" noResize="1" noEditPoints="1" noAdjustHandles="1" noChangeArrowheads="1" noChangeShapeType="1" noTextEdit="1"/>
+          </p:cNvSpPr>
+          <p:nvPr>
+            <p:extLst>
+              <p:ext uri="{386F3935-93C4-4BCD-93E2-E3B085C9AB24}">
+                <p16:designElem xmlns:p16="http://schemas.microsoft.com/office/powerpoint/2015/main" val="1"/>
+              </p:ext>
+            </p:extLst>
+          </p:nvPr>
+        </p:nvSpPr>
+        <p:spPr>
+          <a:xfrm>
+            <a:off x="490408" y="980964"/>
+            <a:ext cx="128016" cy="704088"/>
+          </a:xfrm>
+          <a:prstGeom prst="rect">
+            <a:avLst/>
+          </a:prstGeom>
+          <a:solidFill>
+            <a:schemeClr val="accent2"/>
+          </a:solidFill>
+          <a:ln>
+            <a:noFill/>
+          </a:ln>
+        </p:spPr>
+        <p:style>
+          <a:lnRef idx="2">
+            <a:schemeClr val="accent1">
+              <a:shade val="50000"/>
+            </a:schemeClr>
+          </a:lnRef>
+          <a:fillRef idx="1">
+            <a:schemeClr val="accent1"/>
+          </a:fillRef>
+          <a:effectRef idx="0">
+            <a:schemeClr val="accent1"/>
+          </a:effectRef>
+          <a:fontRef idx="minor">
+            <a:schemeClr val="lt1"/>
+          </a:fontRef>
+        </p:style>
+        <p:txBody>
+          <a:bodyPr rtlCol="0" anchor="ctr"/>
+          <a:lstStyle/>
+          <a:p>
+            <a:pPr marL="0" marR="0" lvl="0" indent="0" algn="ctr" defTabSz="914400" rtl="0" eaLnBrk="1" fontAlgn="auto" latinLnBrk="0" hangingPunct="1">
+              <a:lnSpc>
+                <a:spcPct val="100000"/>
+              </a:lnSpc>
+              <a:spcBef>
+                <a:spcPts val="0"/>
+              </a:spcBef>
+              <a:spcAft>
+                <a:spcPts val="0"/>
+              </a:spcAft>
+              <a:buClrTx/>
+              <a:buSzTx/>
+              <a:buFontTx/>
+              <a:buNone/>
+              <a:tabLst/>
+              <a:defRPr/>
+            </a:pPr>
+            <a:endParaRPr kumimoji="0" lang="en-US" sz="1800" b="0" i="0" u="none" strike="noStrike" kern="1200" cap="none" spc="0" normalizeH="0" baseline="0" noProof="0" dirty="0">
+              <a:ln>
+                <a:noFill/>
+              </a:ln>
+              <a:solidFill>
+                <a:prstClr val="white"/>
+              </a:solidFill>
+              <a:effectLst/>
+              <a:uLnTx/>
+              <a:uFillTx/>
+              <a:latin typeface="Calibri" panose="020F0502020204030204"/>
+              <a:ea typeface="+mn-ea"/>
+              <a:cs typeface="+mn-cs"/>
+            </a:endParaRPr>
+          </a:p>
+        </p:txBody>
+      </p:sp>
+      <p:sp>
+        <p:nvSpPr>
+          <p:cNvPr id="61" name="Rectangle 54">
+            <a:extLst>
+              <a:ext uri="{FF2B5EF4-FFF2-40B4-BE49-F238E27FC236}">
+                <a16:creationId xmlns:a16="http://schemas.microsoft.com/office/drawing/2014/main" id="{10127CDE-2B99-47A8-BB3C-7D17519105E0}"/>
+              </a:ext>
+              <a:ext uri="{C183D7F6-B498-43B3-948B-1728B52AA6E4}">
+                <adec:decorative xmlns:adec="http://schemas.microsoft.com/office/drawing/2017/decorative" val="1"/>
+              </a:ext>
+            </a:extLst>
+          </p:cNvPr>
+          <p:cNvSpPr>
+            <a:spLocks noGrp="1" noRot="1" noChangeAspect="1" noMove="1" noResize="1" noEditPoints="1" noAdjustHandles="1" noChangeArrowheads="1" noChangeShapeType="1" noTextEdit="1"/>
+          </p:cNvSpPr>
+          <p:nvPr>
+            <p:extLst>
+              <p:ext uri="{386F3935-93C4-4BCD-93E2-E3B085C9AB24}">
+                <p16:designElem xmlns:p16="http://schemas.microsoft.com/office/powerpoint/2015/main" val="1"/>
+              </p:ext>
+            </p:extLst>
+          </p:nvPr>
+        </p:nvSpPr>
+        <p:spPr>
+          <a:xfrm rot="5400000">
+            <a:off x="3610864" y="1323863"/>
+            <a:ext cx="1463040" cy="18288"/>
+          </a:xfrm>
+          <a:prstGeom prst="rect">
+            <a:avLst/>
+          </a:prstGeom>
+          <a:solidFill>
+            <a:srgbClr val="D5D5D5"/>
+          </a:solidFill>
+          <a:ln w="3175">
+            <a:noFill/>
+          </a:ln>
+          <a:effectLst/>
+        </p:spPr>
+        <p:style>
+          <a:lnRef idx="2">
+            <a:schemeClr val="accent1">
+              <a:shade val="50000"/>
+            </a:schemeClr>
+          </a:lnRef>
+          <a:fillRef idx="1">
+            <a:schemeClr val="accent1"/>
+          </a:fillRef>
+          <a:effectRef idx="0">
+            <a:schemeClr val="accent1"/>
+          </a:effectRef>
+          <a:fontRef idx="minor">
+            <a:schemeClr val="lt1"/>
+          </a:fontRef>
+        </p:style>
+        <p:txBody>
+          <a:bodyPr rtlCol="0" anchor="ctr"/>
+          <a:lstStyle/>
+          <a:p>
+            <a:pPr marL="0" marR="0" lvl="0" indent="0" algn="ctr" defTabSz="914400" rtl="0" eaLnBrk="1" fontAlgn="auto" latinLnBrk="0" hangingPunct="1">
+              <a:lnSpc>
+                <a:spcPct val="100000"/>
+              </a:lnSpc>
+              <a:spcBef>
+                <a:spcPts val="0"/>
+              </a:spcBef>
+              <a:spcAft>
+                <a:spcPts val="0"/>
+              </a:spcAft>
+              <a:buClrTx/>
+              <a:buSzTx/>
+              <a:buFontTx/>
+              <a:buNone/>
+              <a:tabLst/>
+              <a:defRPr/>
+            </a:pPr>
+            <a:endParaRPr kumimoji="0" lang="en-US" sz="1800" b="0" i="0" u="none" strike="noStrike" kern="1200" cap="none" spc="0" normalizeH="0" baseline="0" noProof="0">
+              <a:ln>
+                <a:noFill/>
+              </a:ln>
+              <a:solidFill>
+                <a:prstClr val="white"/>
+              </a:solidFill>
+              <a:effectLst/>
+              <a:uLnTx/>
+              <a:uFillTx/>
+              <a:latin typeface="Calibri" panose="020F0502020204030204"/>
+              <a:ea typeface="+mn-ea"/>
+              <a:cs typeface="+mn-cs"/>
+            </a:endParaRPr>
+          </a:p>
+        </p:txBody>
+      </p:sp>
+      <p:sp>
+        <p:nvSpPr>
+          <p:cNvPr id="3" name="TextBox 2">
+            <a:extLst>
+              <a:ext uri="{FF2B5EF4-FFF2-40B4-BE49-F238E27FC236}">
+                <a16:creationId xmlns:a16="http://schemas.microsoft.com/office/drawing/2014/main" id="{9CA90A09-4362-4627-9576-C80B36F12989}"/>
+              </a:ext>
+            </a:extLst>
+          </p:cNvPr>
+          <p:cNvSpPr txBox="1"/>
+          <p:nvPr/>
+        </p:nvSpPr>
+        <p:spPr>
+          <a:xfrm>
+            <a:off x="4581144" y="510047"/>
+            <a:ext cx="6858000" cy="1645920"/>
+          </a:xfrm>
+          <a:prstGeom prst="rect">
+            <a:avLst/>
+          </a:prstGeom>
+        </p:spPr>
+        <p:txBody>
+          <a:bodyPr vert="horz" lIns="91440" tIns="45720" rIns="91440" bIns="45720" rtlCol="0" anchor="ctr">
+            <a:normAutofit/>
+          </a:bodyPr>
+          <a:lstStyle/>
+          <a:p>
+            <a:pPr indent="-228600" defTabSz="914400">
+              <a:lnSpc>
+                <a:spcPct val="90000"/>
+              </a:lnSpc>
+              <a:spcAft>
+                <a:spcPts val="600"/>
+              </a:spcAft>
+              <a:buFont typeface="Arial" panose="020B0604020202020204" pitchFamily="34" charset="0"/>
+              <a:buChar char="•"/>
+            </a:pPr>
+            <a:r>
+              <a:rPr lang="en-US" sz="1700" dirty="0"/>
+              <a:t>Rating vs User Votes</a:t>
+            </a:r>
+          </a:p>
+          <a:p>
+            <a:pPr indent="-228600" defTabSz="914400">
+              <a:lnSpc>
+                <a:spcPct val="90000"/>
+              </a:lnSpc>
+              <a:spcAft>
+                <a:spcPts val="600"/>
+              </a:spcAft>
+              <a:buFont typeface="Arial" panose="020B0604020202020204" pitchFamily="34" charset="0"/>
+              <a:buChar char="•"/>
+            </a:pPr>
+            <a:r>
+              <a:rPr lang="en-US" sz="1700" dirty="0"/>
+              <a:t>Rating vs User Votes as per year</a:t>
+            </a:r>
+          </a:p>
+          <a:p>
+            <a:pPr indent="-228600" defTabSz="914400">
+              <a:lnSpc>
+                <a:spcPct val="90000"/>
+              </a:lnSpc>
+              <a:spcAft>
+                <a:spcPts val="600"/>
+              </a:spcAft>
+              <a:buFont typeface="Arial" panose="020B0604020202020204" pitchFamily="34" charset="0"/>
+              <a:buChar char="•"/>
+            </a:pPr>
+            <a:r>
+              <a:rPr lang="en-US" sz="1700" dirty="0"/>
+              <a:t>Director vs Movie Count</a:t>
+            </a:r>
+          </a:p>
+          <a:p>
+            <a:pPr indent="-228600" defTabSz="914400">
+              <a:lnSpc>
+                <a:spcPct val="90000"/>
+              </a:lnSpc>
+              <a:spcAft>
+                <a:spcPts val="600"/>
+              </a:spcAft>
+              <a:buFont typeface="Arial" panose="020B0604020202020204" pitchFamily="34" charset="0"/>
+              <a:buChar char="•"/>
+            </a:pPr>
+            <a:r>
+              <a:rPr lang="en-US" sz="1700" dirty="0"/>
+              <a:t>Genre vs Active Users </a:t>
+            </a:r>
+          </a:p>
+          <a:p>
+            <a:pPr indent="-228600" defTabSz="914400">
+              <a:lnSpc>
+                <a:spcPct val="90000"/>
+              </a:lnSpc>
+              <a:spcAft>
+                <a:spcPts val="600"/>
+              </a:spcAft>
+              <a:buFont typeface="Arial" panose="020B0604020202020204" pitchFamily="34" charset="0"/>
+              <a:buChar char="•"/>
+            </a:pPr>
+            <a:endParaRPr lang="en-US" sz="1700" dirty="0"/>
+          </a:p>
+          <a:p>
+            <a:pPr indent="-228600" defTabSz="914400">
+              <a:lnSpc>
+                <a:spcPct val="90000"/>
+              </a:lnSpc>
+              <a:spcAft>
+                <a:spcPts val="600"/>
+              </a:spcAft>
+              <a:buFont typeface="Arial" panose="020B0604020202020204" pitchFamily="34" charset="0"/>
+              <a:buChar char="•"/>
+            </a:pPr>
+            <a:endParaRPr lang="en-US" sz="1700" dirty="0"/>
+          </a:p>
+        </p:txBody>
+      </p:sp>
+      <p:pic>
+        <p:nvPicPr>
+          <p:cNvPr id="4" name="Picture 3" descr="Chart, bar chart&#10;&#10;Description automatically generated">
+            <a:extLst>
+              <a:ext uri="{FF2B5EF4-FFF2-40B4-BE49-F238E27FC236}">
+                <a16:creationId xmlns:a16="http://schemas.microsoft.com/office/drawing/2014/main" id="{2AD6249F-D9E8-4914-9624-64C2B8CEE88B}"/>
+              </a:ext>
+            </a:extLst>
+          </p:cNvPr>
+          <p:cNvPicPr>
+            <a:picLocks noChangeAspect="1"/>
+          </p:cNvPicPr>
+          <p:nvPr/>
+        </p:nvPicPr>
+        <p:blipFill rotWithShape="1">
+          <a:blip r:embed="rId2"/>
+          <a:srcRect r="3991" b="-2"/>
+          <a:stretch/>
+        </p:blipFill>
+        <p:spPr>
+          <a:xfrm>
+            <a:off x="854209" y="2630505"/>
+            <a:ext cx="4108407" cy="4150896"/>
+          </a:xfrm>
+          <a:prstGeom prst="rect">
+            <a:avLst/>
+          </a:prstGeom>
+        </p:spPr>
+      </p:pic>
+      <p:pic>
+        <p:nvPicPr>
+          <p:cNvPr id="5" name="Picture 4">
+            <a:extLst>
+              <a:ext uri="{FF2B5EF4-FFF2-40B4-BE49-F238E27FC236}">
+                <a16:creationId xmlns:a16="http://schemas.microsoft.com/office/drawing/2014/main" id="{34FC8356-F5FE-4C70-B43D-274473047704}"/>
+              </a:ext>
+            </a:extLst>
+          </p:cNvPr>
+          <p:cNvPicPr>
+            <a:picLocks noChangeAspect="1"/>
+          </p:cNvPicPr>
+          <p:nvPr/>
+        </p:nvPicPr>
+        <p:blipFill>
+          <a:blip r:embed="rId3"/>
+          <a:stretch>
+            <a:fillRect/>
+          </a:stretch>
+        </p:blipFill>
+        <p:spPr>
+          <a:xfrm>
+            <a:off x="6422685" y="2666016"/>
+            <a:ext cx="4274907" cy="4073141"/>
+          </a:xfrm>
+          <a:prstGeom prst="rect">
+            <a:avLst/>
+          </a:prstGeom>
+        </p:spPr>
+      </p:pic>
+    </p:spTree>
+    <p:extLst>
+      <p:ext uri="{BB962C8B-B14F-4D97-AF65-F5344CB8AC3E}">
+        <p14:creationId xmlns:p14="http://schemas.microsoft.com/office/powerpoint/2010/main" val="3905380411"/>
+      </p:ext>
+    </p:extLst>
+  </p:cSld>
+  <p:clrMapOvr>
+    <a:masterClrMapping/>
+  </p:clrMapOvr>
+</p:sld>
+</file>
+
+<file path=ppt/slides/slide14.xml><?xml version="1.0" encoding="utf-8"?>
 <p:sld xmlns:a="http://schemas.openxmlformats.org/drawingml/2006/main" xmlns:r="http://schemas.openxmlformats.org/officeDocument/2006/relationships" xmlns:p="http://schemas.openxmlformats.org/presentationml/2006/main">
   <p:cSld>
     <p:bg>
@@ -17566,7 +18662,7 @@
         </p:blipFill>
         <p:spPr bwMode="auto">
           <a:xfrm>
-            <a:off x="5124450" y="634382"/>
+            <a:off x="5056622" y="634382"/>
             <a:ext cx="6657213" cy="5495162"/>
           </a:xfrm>
           <a:prstGeom prst="rect">
@@ -17597,7 +18693,7 @@
 </p:sld>
 </file>
 
-<file path=ppt/slides/slide13.xml><?xml version="1.0" encoding="utf-8"?>
+<file path=ppt/slides/slide15.xml><?xml version="1.0" encoding="utf-8"?>
 <p:sld xmlns:a="http://schemas.openxmlformats.org/drawingml/2006/main" xmlns:r="http://schemas.openxmlformats.org/officeDocument/2006/relationships" xmlns:p="http://schemas.openxmlformats.org/presentationml/2006/main">
   <p:cSld>
     <p:bg>
@@ -18169,7 +19265,7 @@
 </p:sld>
 </file>
 
-<file path=ppt/slides/slide14.xml><?xml version="1.0" encoding="utf-8"?>
+<file path=ppt/slides/slide16.xml><?xml version="1.0" encoding="utf-8"?>
 <p:sld xmlns:a="http://schemas.openxmlformats.org/drawingml/2006/main" xmlns:r="http://schemas.openxmlformats.org/officeDocument/2006/relationships" xmlns:p="http://schemas.openxmlformats.org/presentationml/2006/main">
   <p:cSld>
     <p:bg>
@@ -19658,7 +20754,7 @@
         </p:nvSpPr>
         <p:spPr>
           <a:xfrm>
-            <a:off x="694510" y="1487272"/>
+            <a:off x="641957" y="1824624"/>
             <a:ext cx="2743200" cy="2743200"/>
           </a:xfrm>
           <a:prstGeom prst="ellipse">
@@ -19691,66 +20787,6 @@
           </a:p>
         </p:txBody>
       </p:sp>
-      <p:pic>
-        <p:nvPicPr>
-          <p:cNvPr id="9" name="Picture 8">
-            <a:extLst>
-              <a:ext uri="{FF2B5EF4-FFF2-40B4-BE49-F238E27FC236}">
-                <a16:creationId xmlns:a16="http://schemas.microsoft.com/office/drawing/2014/main" id="{09B5D4CF-F0D0-465C-8734-0573C1568523}"/>
-              </a:ext>
-            </a:extLst>
-          </p:cNvPr>
-          <p:cNvPicPr>
-            <a:picLocks noChangeAspect="1"/>
-          </p:cNvPicPr>
-          <p:nvPr/>
-        </p:nvPicPr>
-        <p:blipFill>
-          <a:blip r:embed="rId2"/>
-          <a:stretch>
-            <a:fillRect/>
-          </a:stretch>
-        </p:blipFill>
-        <p:spPr>
-          <a:xfrm>
-            <a:off x="4209473" y="1451198"/>
-            <a:ext cx="3118275" cy="2907792"/>
-          </a:xfrm>
-          <a:prstGeom prst="rect">
-            <a:avLst/>
-          </a:prstGeom>
-        </p:spPr>
-      </p:pic>
-      <p:pic>
-        <p:nvPicPr>
-          <p:cNvPr id="7" name="Picture 6">
-            <a:extLst>
-              <a:ext uri="{FF2B5EF4-FFF2-40B4-BE49-F238E27FC236}">
-                <a16:creationId xmlns:a16="http://schemas.microsoft.com/office/drawing/2014/main" id="{64A46E1E-C303-40CE-87CE-3012C218C265}"/>
-              </a:ext>
-            </a:extLst>
-          </p:cNvPr>
-          <p:cNvPicPr>
-            <a:picLocks noChangeAspect="1"/>
-          </p:cNvPicPr>
-          <p:nvPr/>
-        </p:nvPicPr>
-        <p:blipFill>
-          <a:blip r:embed="rId3"/>
-          <a:stretch>
-            <a:fillRect/>
-          </a:stretch>
-        </p:blipFill>
-        <p:spPr>
-          <a:xfrm>
-            <a:off x="7770367" y="2057400"/>
-            <a:ext cx="3456432" cy="2590799"/>
-          </a:xfrm>
-          <a:prstGeom prst="rect">
-            <a:avLst/>
-          </a:prstGeom>
-        </p:spPr>
-      </p:pic>
       <p:sp>
         <p:nvSpPr>
           <p:cNvPr id="48" name="Content Placeholder 2">
@@ -19767,7 +20803,7 @@
         </p:nvSpPr>
         <p:spPr>
           <a:xfrm>
-            <a:off x="4038600" y="4999173"/>
+            <a:off x="3647983" y="5504456"/>
             <a:ext cx="7188199" cy="1292090"/>
           </a:xfrm>
           <a:prstGeom prst="rect">
@@ -19907,6 +20943,36 @@
           </a:p>
         </p:txBody>
       </p:sp>
+      <p:pic>
+        <p:nvPicPr>
+          <p:cNvPr id="3" name="Picture 2">
+            <a:extLst>
+              <a:ext uri="{FF2B5EF4-FFF2-40B4-BE49-F238E27FC236}">
+                <a16:creationId xmlns:a16="http://schemas.microsoft.com/office/drawing/2014/main" id="{8C174A73-3E07-4321-A718-0AD14E75B5C9}"/>
+              </a:ext>
+            </a:extLst>
+          </p:cNvPr>
+          <p:cNvPicPr>
+            <a:picLocks noChangeAspect="1"/>
+          </p:cNvPicPr>
+          <p:nvPr/>
+        </p:nvPicPr>
+        <p:blipFill>
+          <a:blip r:embed="rId2"/>
+          <a:stretch>
+            <a:fillRect/>
+          </a:stretch>
+        </p:blipFill>
+        <p:spPr>
+          <a:xfrm>
+            <a:off x="3761078" y="683836"/>
+            <a:ext cx="5423562" cy="4729765"/>
+          </a:xfrm>
+          <a:prstGeom prst="rect">
+            <a:avLst/>
+          </a:prstGeom>
+        </p:spPr>
+      </p:pic>
     </p:spTree>
     <p:extLst>
       <p:ext uri="{BB962C8B-B14F-4D97-AF65-F5344CB8AC3E}">
@@ -19921,6 +20987,247 @@
 </file>
 
 <file path=ppt/slides/slide6.xml><?xml version="1.0" encoding="utf-8"?>
+<p:sld xmlns:a="http://schemas.openxmlformats.org/drawingml/2006/main" xmlns:r="http://schemas.openxmlformats.org/officeDocument/2006/relationships" xmlns:p="http://schemas.openxmlformats.org/presentationml/2006/main">
+  <p:cSld>
+    <p:bg>
+      <p:bgPr>
+        <a:solidFill>
+          <a:schemeClr val="bg1"/>
+        </a:solidFill>
+        <a:effectLst/>
+      </p:bgPr>
+    </p:bg>
+    <p:spTree>
+      <p:nvGrpSpPr>
+        <p:cNvPr id="1" name=""/>
+        <p:cNvGrpSpPr/>
+        <p:nvPr/>
+      </p:nvGrpSpPr>
+      <p:grpSpPr>
+        <a:xfrm>
+          <a:off x="0" y="0"/>
+          <a:ext cx="0" cy="0"/>
+          <a:chOff x="0" y="0"/>
+          <a:chExt cx="0" cy="0"/>
+        </a:xfrm>
+      </p:grpSpPr>
+      <p:sp>
+        <p:nvSpPr>
+          <p:cNvPr id="130" name="Rectangle 125">
+            <a:extLst>
+              <a:ext uri="{FF2B5EF4-FFF2-40B4-BE49-F238E27FC236}">
+                <a16:creationId xmlns:a16="http://schemas.microsoft.com/office/drawing/2014/main" id="{42A5316D-ED2F-4F89-B4B4-8D9240B1A348}"/>
+              </a:ext>
+              <a:ext uri="{C183D7F6-B498-43B3-948B-1728B52AA6E4}">
+                <adec:decorative xmlns:adec="http://schemas.microsoft.com/office/drawing/2017/decorative" val="1"/>
+              </a:ext>
+            </a:extLst>
+          </p:cNvPr>
+          <p:cNvSpPr>
+            <a:spLocks noGrp="1" noRot="1" noChangeAspect="1" noMove="1" noResize="1" noEditPoints="1" noAdjustHandles="1" noChangeArrowheads="1" noChangeShapeType="1" noTextEdit="1"/>
+          </p:cNvSpPr>
+          <p:nvPr>
+            <p:extLst>
+              <p:ext uri="{386F3935-93C4-4BCD-93E2-E3B085C9AB24}">
+                <p16:designElem xmlns:p16="http://schemas.microsoft.com/office/powerpoint/2015/main" val="1"/>
+              </p:ext>
+            </p:extLst>
+          </p:nvPr>
+        </p:nvSpPr>
+        <p:spPr>
+          <a:xfrm>
+            <a:off x="0" y="0"/>
+            <a:ext cx="2013557" cy="6858000"/>
+          </a:xfrm>
+          <a:prstGeom prst="rect">
+            <a:avLst/>
+          </a:prstGeom>
+          <a:solidFill>
+            <a:srgbClr val="7F7F7F"/>
+          </a:solidFill>
+          <a:ln>
+            <a:noFill/>
+          </a:ln>
+        </p:spPr>
+        <p:style>
+          <a:lnRef idx="2">
+            <a:schemeClr val="accent1">
+              <a:shade val="50000"/>
+            </a:schemeClr>
+          </a:lnRef>
+          <a:fillRef idx="1">
+            <a:schemeClr val="accent1"/>
+          </a:fillRef>
+          <a:effectRef idx="0">
+            <a:schemeClr val="accent1"/>
+          </a:effectRef>
+          <a:fontRef idx="minor">
+            <a:schemeClr val="lt1"/>
+          </a:fontRef>
+        </p:style>
+        <p:txBody>
+          <a:bodyPr rtlCol="0" anchor="ctr"/>
+          <a:lstStyle/>
+          <a:p>
+            <a:pPr marL="0" marR="0" lvl="0" indent="0" algn="ctr" defTabSz="914400" rtl="0" eaLnBrk="1" fontAlgn="auto" latinLnBrk="0" hangingPunct="1">
+              <a:lnSpc>
+                <a:spcPct val="100000"/>
+              </a:lnSpc>
+              <a:spcBef>
+                <a:spcPts val="0"/>
+              </a:spcBef>
+              <a:spcAft>
+                <a:spcPts val="0"/>
+              </a:spcAft>
+              <a:buClrTx/>
+              <a:buSzTx/>
+              <a:buFontTx/>
+              <a:buNone/>
+              <a:tabLst/>
+              <a:defRPr/>
+            </a:pPr>
+            <a:endParaRPr kumimoji="0" lang="en-US" sz="1800" b="0" i="0" u="none" strike="noStrike" kern="1200" cap="none" spc="0" normalizeH="0" baseline="0" noProof="0">
+              <a:ln>
+                <a:noFill/>
+              </a:ln>
+              <a:solidFill>
+                <a:prstClr val="white"/>
+              </a:solidFill>
+              <a:effectLst/>
+              <a:uLnTx/>
+              <a:uFillTx/>
+              <a:latin typeface="Calibri" panose="020F0502020204030204"/>
+              <a:ea typeface="+mn-ea"/>
+              <a:cs typeface="+mn-cs"/>
+            </a:endParaRPr>
+          </a:p>
+        </p:txBody>
+      </p:sp>
+      <p:sp>
+        <p:nvSpPr>
+          <p:cNvPr id="2" name="Title 1">
+            <a:extLst>
+              <a:ext uri="{FF2B5EF4-FFF2-40B4-BE49-F238E27FC236}">
+                <a16:creationId xmlns:a16="http://schemas.microsoft.com/office/drawing/2014/main" id="{9235B876-FF92-4568-8404-06E860A2E660}"/>
+              </a:ext>
+            </a:extLst>
+          </p:cNvPr>
+          <p:cNvSpPr>
+            <a:spLocks noGrp="1"/>
+          </p:cNvSpPr>
+          <p:nvPr>
+            <p:ph type="title"/>
+          </p:nvPr>
+        </p:nvSpPr>
+        <p:spPr>
+          <a:xfrm>
+            <a:off x="641957" y="1824624"/>
+            <a:ext cx="2743200" cy="2743200"/>
+          </a:xfrm>
+          <a:prstGeom prst="ellipse">
+            <a:avLst/>
+          </a:prstGeom>
+          <a:solidFill>
+            <a:srgbClr val="262626"/>
+          </a:solidFill>
+          <a:ln w="174625" cmpd="thinThick">
+            <a:solidFill>
+              <a:srgbClr val="262626"/>
+            </a:solidFill>
+          </a:ln>
+        </p:spPr>
+        <p:txBody>
+          <a:bodyPr vert="horz" lIns="91440" tIns="45720" rIns="91440" bIns="45720" rtlCol="0" anchor="ctr">
+            <a:normAutofit/>
+          </a:bodyPr>
+          <a:lstStyle/>
+          <a:p>
+            <a:pPr algn="ctr"/>
+            <a:r>
+              <a:rPr lang="en-US" sz="2600">
+                <a:solidFill>
+                  <a:srgbClr val="FFFFFF"/>
+                </a:solidFill>
+              </a:rPr>
+              <a:t>Initial Data </a:t>
+            </a:r>
+          </a:p>
+        </p:txBody>
+      </p:sp>
+      <p:pic>
+        <p:nvPicPr>
+          <p:cNvPr id="4" name="Picture 3">
+            <a:extLst>
+              <a:ext uri="{FF2B5EF4-FFF2-40B4-BE49-F238E27FC236}">
+                <a16:creationId xmlns:a16="http://schemas.microsoft.com/office/drawing/2014/main" id="{2914FFAA-C458-4A97-9E30-3119FA5B0CA7}"/>
+              </a:ext>
+            </a:extLst>
+          </p:cNvPr>
+          <p:cNvPicPr>
+            <a:picLocks noChangeAspect="1"/>
+          </p:cNvPicPr>
+          <p:nvPr/>
+        </p:nvPicPr>
+        <p:blipFill>
+          <a:blip r:embed="rId2"/>
+          <a:stretch>
+            <a:fillRect/>
+          </a:stretch>
+        </p:blipFill>
+        <p:spPr>
+          <a:xfrm>
+            <a:off x="3459016" y="1824624"/>
+            <a:ext cx="8468824" cy="2428239"/>
+          </a:xfrm>
+          <a:prstGeom prst="rect">
+            <a:avLst/>
+          </a:prstGeom>
+        </p:spPr>
+      </p:pic>
+      <p:pic>
+        <p:nvPicPr>
+          <p:cNvPr id="5" name="Picture 4">
+            <a:extLst>
+              <a:ext uri="{FF2B5EF4-FFF2-40B4-BE49-F238E27FC236}">
+                <a16:creationId xmlns:a16="http://schemas.microsoft.com/office/drawing/2014/main" id="{4778CE1B-0328-485B-9D59-49EAE56806BB}"/>
+              </a:ext>
+            </a:extLst>
+          </p:cNvPr>
+          <p:cNvPicPr>
+            <a:picLocks noChangeAspect="1"/>
+          </p:cNvPicPr>
+          <p:nvPr/>
+        </p:nvPicPr>
+        <p:blipFill>
+          <a:blip r:embed="rId3"/>
+          <a:stretch>
+            <a:fillRect/>
+          </a:stretch>
+        </p:blipFill>
+        <p:spPr>
+          <a:xfrm>
+            <a:off x="2539725" y="731519"/>
+            <a:ext cx="9225555" cy="693145"/>
+          </a:xfrm>
+          <a:prstGeom prst="rect">
+            <a:avLst/>
+          </a:prstGeom>
+        </p:spPr>
+      </p:pic>
+    </p:spTree>
+    <p:extLst>
+      <p:ext uri="{BB962C8B-B14F-4D97-AF65-F5344CB8AC3E}">
+        <p14:creationId xmlns:p14="http://schemas.microsoft.com/office/powerpoint/2010/main" val="2085080775"/>
+      </p:ext>
+    </p:extLst>
+  </p:cSld>
+  <p:clrMapOvr>
+    <a:masterClrMapping/>
+  </p:clrMapOvr>
+</p:sld>
+</file>
+
+<file path=ppt/slides/slide7.xml><?xml version="1.0" encoding="utf-8"?>
 <p:sld xmlns:a="http://schemas.openxmlformats.org/drawingml/2006/main" xmlns:r="http://schemas.openxmlformats.org/officeDocument/2006/relationships" xmlns:p="http://schemas.openxmlformats.org/presentationml/2006/main">
   <p:cSld>
     <p:bg>
@@ -20286,8 +21593,8 @@
         </p:blipFill>
         <p:spPr>
           <a:xfrm>
-            <a:off x="6261607" y="1"/>
-            <a:ext cx="3519312" cy="3007909"/>
+            <a:off x="6206740" y="-354266"/>
+            <a:ext cx="4022522" cy="3437996"/>
           </a:xfrm>
           <a:custGeom>
             <a:avLst/>
@@ -20376,7 +21683,7 @@
 </p:sld>
 </file>
 
-<file path=ppt/slides/slide7.xml><?xml version="1.0" encoding="utf-8"?>
+<file path=ppt/slides/slide8.xml><?xml version="1.0" encoding="utf-8"?>
 <p:sld xmlns:a="http://schemas.openxmlformats.org/drawingml/2006/main" xmlns:r="http://schemas.openxmlformats.org/officeDocument/2006/relationships" xmlns:p="http://schemas.openxmlformats.org/presentationml/2006/main">
   <p:cSld>
     <p:bg>
@@ -21043,7 +22350,7 @@
 </p:sld>
 </file>
 
-<file path=ppt/slides/slide8.xml><?xml version="1.0" encoding="utf-8"?>
+<file path=ppt/slides/slide9.xml><?xml version="1.0" encoding="utf-8"?>
 <p:sld xmlns:a="http://schemas.openxmlformats.org/drawingml/2006/main" xmlns:r="http://schemas.openxmlformats.org/officeDocument/2006/relationships" xmlns:p="http://schemas.openxmlformats.org/presentationml/2006/main">
   <p:cSld>
     <p:bg>
@@ -21201,558 +22508,6 @@
     <p:extLst>
       <p:ext uri="{BB962C8B-B14F-4D97-AF65-F5344CB8AC3E}">
         <p14:creationId xmlns:p14="http://schemas.microsoft.com/office/powerpoint/2010/main" val="430756230"/>
-      </p:ext>
-    </p:extLst>
-  </p:cSld>
-  <p:clrMapOvr>
-    <a:masterClrMapping/>
-  </p:clrMapOvr>
-</p:sld>
-</file>
-
-<file path=ppt/slides/slide9.xml><?xml version="1.0" encoding="utf-8"?>
-<p:sld xmlns:a="http://schemas.openxmlformats.org/drawingml/2006/main" xmlns:r="http://schemas.openxmlformats.org/officeDocument/2006/relationships" xmlns:p="http://schemas.openxmlformats.org/presentationml/2006/main">
-  <p:cSld>
-    <p:bg>
-      <p:bgPr>
-        <a:solidFill>
-          <a:schemeClr val="bg1"/>
-        </a:solidFill>
-        <a:effectLst/>
-      </p:bgPr>
-    </p:bg>
-    <p:spTree>
-      <p:nvGrpSpPr>
-        <p:cNvPr id="1" name=""/>
-        <p:cNvGrpSpPr/>
-        <p:nvPr/>
-      </p:nvGrpSpPr>
-      <p:grpSpPr>
-        <a:xfrm>
-          <a:off x="0" y="0"/>
-          <a:ext cx="0" cy="0"/>
-          <a:chOff x="0" y="0"/>
-          <a:chExt cx="0" cy="0"/>
-        </a:xfrm>
-      </p:grpSpPr>
-      <p:sp useBgFill="1">
-        <p:nvSpPr>
-          <p:cNvPr id="33" name="Rectangle 25">
-            <a:extLst>
-              <a:ext uri="{FF2B5EF4-FFF2-40B4-BE49-F238E27FC236}">
-                <a16:creationId xmlns:a16="http://schemas.microsoft.com/office/drawing/2014/main" id="{201CC55D-ED54-4C5C-95E6-10947BD1103B}"/>
-              </a:ext>
-              <a:ext uri="{C183D7F6-B498-43B3-948B-1728B52AA6E4}">
-                <adec:decorative xmlns:adec="http://schemas.microsoft.com/office/drawing/2017/decorative" val="1"/>
-              </a:ext>
-            </a:extLst>
-          </p:cNvPr>
-          <p:cNvSpPr>
-            <a:spLocks noGrp="1" noRot="1" noChangeAspect="1" noMove="1" noResize="1" noEditPoints="1" noAdjustHandles="1" noChangeArrowheads="1" noChangeShapeType="1" noTextEdit="1"/>
-          </p:cNvSpPr>
-          <p:nvPr>
-            <p:extLst>
-              <p:ext uri="{386F3935-93C4-4BCD-93E2-E3B085C9AB24}">
-                <p16:designElem xmlns:p16="http://schemas.microsoft.com/office/powerpoint/2015/main" val="1"/>
-              </p:ext>
-            </p:extLst>
-          </p:nvPr>
-        </p:nvSpPr>
-        <p:spPr>
-          <a:xfrm>
-            <a:off x="0" y="0"/>
-            <a:ext cx="12191999" cy="6857365"/>
-          </a:xfrm>
-          <a:prstGeom prst="rect">
-            <a:avLst/>
-          </a:prstGeom>
-          <a:ln>
-            <a:noFill/>
-          </a:ln>
-        </p:spPr>
-        <p:style>
-          <a:lnRef idx="2">
-            <a:schemeClr val="accent1">
-              <a:shade val="50000"/>
-            </a:schemeClr>
-          </a:lnRef>
-          <a:fillRef idx="1">
-            <a:schemeClr val="accent1"/>
-          </a:fillRef>
-          <a:effectRef idx="0">
-            <a:schemeClr val="accent1"/>
-          </a:effectRef>
-          <a:fontRef idx="minor">
-            <a:schemeClr val="lt1"/>
-          </a:fontRef>
-        </p:style>
-        <p:txBody>
-          <a:bodyPr rtlCol="0" anchor="ctr"/>
-          <a:lstStyle/>
-          <a:p>
-            <a:pPr algn="ctr"/>
-            <a:endParaRPr lang="en-US"/>
-          </a:p>
-        </p:txBody>
-      </p:sp>
-      <p:sp>
-        <p:nvSpPr>
-          <p:cNvPr id="2" name="Title 1">
-            <a:extLst>
-              <a:ext uri="{FF2B5EF4-FFF2-40B4-BE49-F238E27FC236}">
-                <a16:creationId xmlns:a16="http://schemas.microsoft.com/office/drawing/2014/main" id="{9235B876-FF92-4568-8404-06E860A2E660}"/>
-              </a:ext>
-            </a:extLst>
-          </p:cNvPr>
-          <p:cNvSpPr>
-            <a:spLocks noGrp="1"/>
-          </p:cNvSpPr>
-          <p:nvPr>
-            <p:ph type="title"/>
-          </p:nvPr>
-        </p:nvSpPr>
-        <p:spPr>
-          <a:xfrm>
-            <a:off x="589560" y="856180"/>
-            <a:ext cx="4560584" cy="1128068"/>
-          </a:xfrm>
-        </p:spPr>
-        <p:txBody>
-          <a:bodyPr vert="horz" lIns="91440" tIns="45720" rIns="91440" bIns="45720" rtlCol="0" anchor="ctr">
-            <a:normAutofit/>
-          </a:bodyPr>
-          <a:lstStyle/>
-          <a:p>
-            <a:r>
-              <a:rPr lang="en-US" sz="4000" kern="1200" dirty="0">
-                <a:latin typeface="+mj-lt"/>
-                <a:ea typeface="+mj-ea"/>
-                <a:cs typeface="+mj-cs"/>
-              </a:rPr>
-              <a:t>Results</a:t>
-            </a:r>
-          </a:p>
-        </p:txBody>
-      </p:sp>
-      <p:grpSp>
-        <p:nvGrpSpPr>
-          <p:cNvPr id="35" name="Group 27">
-            <a:extLst>
-              <a:ext uri="{FF2B5EF4-FFF2-40B4-BE49-F238E27FC236}">
-                <a16:creationId xmlns:a16="http://schemas.microsoft.com/office/drawing/2014/main" id="{1DE889C7-FAD6-4397-98E2-05D503484459}"/>
-              </a:ext>
-              <a:ext uri="{C183D7F6-B498-43B3-948B-1728B52AA6E4}">
-                <adec:decorative xmlns:adec="http://schemas.microsoft.com/office/drawing/2017/decorative" val="1"/>
-              </a:ext>
-            </a:extLst>
-          </p:cNvPr>
-          <p:cNvGrpSpPr>
-            <a:grpSpLocks noGrp="1" noUngrp="1" noRot="1" noChangeAspect="1" noMove="1" noResize="1"/>
-          </p:cNvGrpSpPr>
-          <p:nvPr>
-            <p:extLst>
-              <p:ext uri="{386F3935-93C4-4BCD-93E2-E3B085C9AB24}">
-                <p16:designElem xmlns:p16="http://schemas.microsoft.com/office/powerpoint/2015/main" val="1"/>
-              </p:ext>
-            </p:extLst>
-          </p:nvPr>
-        </p:nvGrpSpPr>
-        <p:grpSpPr>
-          <a:xfrm>
-            <a:off x="0" y="1083484"/>
-            <a:ext cx="355196" cy="673460"/>
-            <a:chOff x="0" y="823811"/>
-            <a:chExt cx="355196" cy="673460"/>
-          </a:xfrm>
-        </p:grpSpPr>
-        <p:sp>
-          <p:nvSpPr>
-            <p:cNvPr id="29" name="Rectangle 28">
-              <a:extLst>
-                <a:ext uri="{FF2B5EF4-FFF2-40B4-BE49-F238E27FC236}">
-                  <a16:creationId xmlns:a16="http://schemas.microsoft.com/office/drawing/2014/main" id="{F399A70F-F8CD-4992-9EF5-6CF15472E73F}"/>
-                </a:ext>
-                <a:ext uri="{C183D7F6-B498-43B3-948B-1728B52AA6E4}">
-                  <adec:decorative xmlns:adec="http://schemas.microsoft.com/office/drawing/2017/decorative" val="1"/>
-                </a:ext>
-              </a:extLst>
-            </p:cNvPr>
-            <p:cNvSpPr/>
-            <p:nvPr>
-              <p:extLst>
-                <p:ext uri="{386F3935-93C4-4BCD-93E2-E3B085C9AB24}">
-                  <p16:designElem xmlns:p16="http://schemas.microsoft.com/office/powerpoint/2015/main" val="1"/>
-                </p:ext>
-              </p:extLst>
-            </p:nvPr>
-          </p:nvSpPr>
-          <p:spPr>
-            <a:xfrm>
-              <a:off x="0" y="823811"/>
-              <a:ext cx="87363" cy="673460"/>
-            </a:xfrm>
-            <a:prstGeom prst="rect">
-              <a:avLst/>
-            </a:prstGeom>
-            <a:solidFill>
-              <a:schemeClr val="accent4"/>
-            </a:solidFill>
-            <a:ln>
-              <a:noFill/>
-            </a:ln>
-          </p:spPr>
-          <p:style>
-            <a:lnRef idx="2">
-              <a:schemeClr val="accent1">
-                <a:shade val="50000"/>
-              </a:schemeClr>
-            </a:lnRef>
-            <a:fillRef idx="1">
-              <a:schemeClr val="accent1"/>
-            </a:fillRef>
-            <a:effectRef idx="0">
-              <a:schemeClr val="accent1"/>
-            </a:effectRef>
-            <a:fontRef idx="minor">
-              <a:schemeClr val="lt1"/>
-            </a:fontRef>
-          </p:style>
-          <p:txBody>
-            <a:bodyPr rtlCol="0" anchor="ctr"/>
-            <a:lstStyle/>
-            <a:p>
-              <a:pPr algn="ctr"/>
-              <a:endParaRPr lang="en-US"/>
-            </a:p>
-          </p:txBody>
-        </p:sp>
-        <p:sp>
-          <p:nvSpPr>
-            <p:cNvPr id="37" name="Rectangle 29">
-              <a:extLst>
-                <a:ext uri="{FF2B5EF4-FFF2-40B4-BE49-F238E27FC236}">
-                  <a16:creationId xmlns:a16="http://schemas.microsoft.com/office/drawing/2014/main" id="{48F4FEDC-6D80-458C-A665-075D9B9500FD}"/>
-                </a:ext>
-                <a:ext uri="{C183D7F6-B498-43B3-948B-1728B52AA6E4}">
-                  <adec:decorative xmlns:adec="http://schemas.microsoft.com/office/drawing/2017/decorative" val="1"/>
-                </a:ext>
-              </a:extLst>
-            </p:cNvPr>
-            <p:cNvSpPr/>
-            <p:nvPr>
-              <p:extLst>
-                <p:ext uri="{386F3935-93C4-4BCD-93E2-E3B085C9AB24}">
-                  <p16:designElem xmlns:p16="http://schemas.microsoft.com/office/powerpoint/2015/main" val="1"/>
-                </p:ext>
-              </p:extLst>
-            </p:nvPr>
-          </p:nvSpPr>
-          <p:spPr>
-            <a:xfrm>
-              <a:off x="159341" y="823811"/>
-              <a:ext cx="195855" cy="673460"/>
-            </a:xfrm>
-            <a:prstGeom prst="rect">
-              <a:avLst/>
-            </a:prstGeom>
-            <a:solidFill>
-              <a:schemeClr val="accent4"/>
-            </a:solidFill>
-            <a:ln>
-              <a:noFill/>
-            </a:ln>
-          </p:spPr>
-          <p:style>
-            <a:lnRef idx="2">
-              <a:schemeClr val="accent1">
-                <a:shade val="50000"/>
-              </a:schemeClr>
-            </a:lnRef>
-            <a:fillRef idx="1">
-              <a:schemeClr val="accent1"/>
-            </a:fillRef>
-            <a:effectRef idx="0">
-              <a:schemeClr val="accent1"/>
-            </a:effectRef>
-            <a:fontRef idx="minor">
-              <a:schemeClr val="lt1"/>
-            </a:fontRef>
-          </p:style>
-          <p:txBody>
-            <a:bodyPr rtlCol="0" anchor="ctr"/>
-            <a:lstStyle/>
-            <a:p>
-              <a:pPr algn="ctr"/>
-              <a:endParaRPr lang="en-US"/>
-            </a:p>
-          </p:txBody>
-        </p:sp>
-      </p:grpSp>
-      <p:sp>
-        <p:nvSpPr>
-          <p:cNvPr id="32" name="Rectangle 31">
-            <a:extLst>
-              <a:ext uri="{FF2B5EF4-FFF2-40B4-BE49-F238E27FC236}">
-                <a16:creationId xmlns:a16="http://schemas.microsoft.com/office/drawing/2014/main" id="{3873B707-463F-40B0-8227-E8CC6C67EB25}"/>
-              </a:ext>
-              <a:ext uri="{C183D7F6-B498-43B3-948B-1728B52AA6E4}">
-                <adec:decorative xmlns:adec="http://schemas.microsoft.com/office/drawing/2017/decorative" val="1"/>
-              </a:ext>
-            </a:extLst>
-          </p:cNvPr>
-          <p:cNvSpPr>
-            <a:spLocks noGrp="1" noRot="1" noChangeAspect="1" noMove="1" noResize="1" noEditPoints="1" noAdjustHandles="1" noChangeArrowheads="1" noChangeShapeType="1" noTextEdit="1"/>
-          </p:cNvSpPr>
-          <p:nvPr>
-            <p:extLst>
-              <p:ext uri="{386F3935-93C4-4BCD-93E2-E3B085C9AB24}">
-                <p16:designElem xmlns:p16="http://schemas.microsoft.com/office/powerpoint/2015/main" val="1"/>
-              </p:ext>
-            </p:extLst>
-          </p:nvPr>
-        </p:nvSpPr>
-        <p:spPr>
-          <a:xfrm flipH="1">
-            <a:off x="665085" y="2090569"/>
-            <a:ext cx="4297680" cy="27432"/>
-          </a:xfrm>
-          <a:prstGeom prst="rect">
-            <a:avLst/>
-          </a:prstGeom>
-          <a:solidFill>
-            <a:schemeClr val="accent4"/>
-          </a:solidFill>
-          <a:ln>
-            <a:noFill/>
-          </a:ln>
-        </p:spPr>
-        <p:style>
-          <a:lnRef idx="2">
-            <a:schemeClr val="accent1">
-              <a:shade val="50000"/>
-            </a:schemeClr>
-          </a:lnRef>
-          <a:fillRef idx="1">
-            <a:schemeClr val="accent1"/>
-          </a:fillRef>
-          <a:effectRef idx="0">
-            <a:schemeClr val="accent1"/>
-          </a:effectRef>
-          <a:fontRef idx="minor">
-            <a:schemeClr val="lt1"/>
-          </a:fontRef>
-        </p:style>
-        <p:txBody>
-          <a:bodyPr rtlCol="0" anchor="ctr"/>
-          <a:lstStyle/>
-          <a:p>
-            <a:pPr algn="ctr"/>
-            <a:endParaRPr lang="en-US"/>
-          </a:p>
-        </p:txBody>
-      </p:sp>
-      <p:sp>
-        <p:nvSpPr>
-          <p:cNvPr id="34" name="Rectangle 33">
-            <a:extLst>
-              <a:ext uri="{FF2B5EF4-FFF2-40B4-BE49-F238E27FC236}">
-                <a16:creationId xmlns:a16="http://schemas.microsoft.com/office/drawing/2014/main" id="{C13237C8-E62C-4F0D-A318-BD6FB6C2D138}"/>
-              </a:ext>
-              <a:ext uri="{C183D7F6-B498-43B3-948B-1728B52AA6E4}">
-                <adec:decorative xmlns:adec="http://schemas.microsoft.com/office/drawing/2017/decorative" val="1"/>
-              </a:ext>
-            </a:extLst>
-          </p:cNvPr>
-          <p:cNvSpPr>
-            <a:spLocks noGrp="1" noRot="1" noChangeAspect="1" noMove="1" noResize="1" noEditPoints="1" noAdjustHandles="1" noChangeArrowheads="1" noChangeShapeType="1" noTextEdit="1"/>
-          </p:cNvSpPr>
-          <p:nvPr>
-            <p:extLst>
-              <p:ext uri="{386F3935-93C4-4BCD-93E2-E3B085C9AB24}">
-                <p16:designElem xmlns:p16="http://schemas.microsoft.com/office/powerpoint/2015/main" val="1"/>
-              </p:ext>
-            </p:extLst>
-          </p:nvPr>
-        </p:nvSpPr>
-        <p:spPr>
-          <a:xfrm flipH="1">
-            <a:off x="10697670" y="0"/>
-            <a:ext cx="1494330" cy="6858000"/>
-          </a:xfrm>
-          <a:prstGeom prst="rect">
-            <a:avLst/>
-          </a:prstGeom>
-          <a:solidFill>
-            <a:schemeClr val="accent4"/>
-          </a:solidFill>
-          <a:ln>
-            <a:noFill/>
-          </a:ln>
-        </p:spPr>
-        <p:style>
-          <a:lnRef idx="2">
-            <a:schemeClr val="accent1">
-              <a:shade val="50000"/>
-            </a:schemeClr>
-          </a:lnRef>
-          <a:fillRef idx="1">
-            <a:schemeClr val="accent1"/>
-          </a:fillRef>
-          <a:effectRef idx="0">
-            <a:schemeClr val="accent1"/>
-          </a:effectRef>
-          <a:fontRef idx="minor">
-            <a:schemeClr val="lt1"/>
-          </a:fontRef>
-        </p:style>
-        <p:txBody>
-          <a:bodyPr rtlCol="0" anchor="ctr"/>
-          <a:lstStyle/>
-          <a:p>
-            <a:pPr algn="ctr"/>
-            <a:endParaRPr lang="en-US"/>
-          </a:p>
-        </p:txBody>
-      </p:sp>
-      <p:sp>
-        <p:nvSpPr>
-          <p:cNvPr id="36" name="Rectangle 35">
-            <a:extLst>
-              <a:ext uri="{FF2B5EF4-FFF2-40B4-BE49-F238E27FC236}">
-                <a16:creationId xmlns:a16="http://schemas.microsoft.com/office/drawing/2014/main" id="{19C9EAEA-39D0-4B0E-A0EB-51E7B26740B1}"/>
-              </a:ext>
-              <a:ext uri="{C183D7F6-B498-43B3-948B-1728B52AA6E4}">
-                <adec:decorative xmlns:adec="http://schemas.microsoft.com/office/drawing/2017/decorative" val="1"/>
-              </a:ext>
-            </a:extLst>
-          </p:cNvPr>
-          <p:cNvSpPr>
-            <a:spLocks noGrp="1" noRot="1" noChangeAspect="1" noMove="1" noResize="1" noEditPoints="1" noAdjustHandles="1" noChangeArrowheads="1" noChangeShapeType="1" noTextEdit="1"/>
-          </p:cNvSpPr>
-          <p:nvPr>
-            <p:extLst>
-              <p:ext uri="{386F3935-93C4-4BCD-93E2-E3B085C9AB24}">
-                <p16:designElem xmlns:p16="http://schemas.microsoft.com/office/powerpoint/2015/main" val="1"/>
-              </p:ext>
-            </p:extLst>
-          </p:nvPr>
-        </p:nvSpPr>
-        <p:spPr>
-          <a:xfrm>
-            <a:off x="5685810" y="513853"/>
-            <a:ext cx="6009366" cy="5834577"/>
-          </a:xfrm>
-          <a:prstGeom prst="rect">
-            <a:avLst/>
-          </a:prstGeom>
-          <a:solidFill>
-            <a:schemeClr val="bg1"/>
-          </a:solidFill>
-          <a:ln>
-            <a:noFill/>
-          </a:ln>
-          <a:effectLst>
-            <a:outerShdw blurRad="139700" dist="127000" dir="5400000" algn="t" rotWithShape="0">
-              <a:prstClr val="black">
-                <a:alpha val="15000"/>
-              </a:prstClr>
-            </a:outerShdw>
-          </a:effectLst>
-        </p:spPr>
-        <p:style>
-          <a:lnRef idx="2">
-            <a:schemeClr val="accent1">
-              <a:shade val="50000"/>
-            </a:schemeClr>
-          </a:lnRef>
-          <a:fillRef idx="1">
-            <a:schemeClr val="accent1"/>
-          </a:fillRef>
-          <a:effectRef idx="0">
-            <a:schemeClr val="accent1"/>
-          </a:effectRef>
-          <a:fontRef idx="minor">
-            <a:schemeClr val="lt1"/>
-          </a:fontRef>
-        </p:style>
-        <p:txBody>
-          <a:bodyPr rtlCol="0" anchor="ctr"/>
-          <a:lstStyle/>
-          <a:p>
-            <a:pPr algn="ctr"/>
-            <a:endParaRPr lang="en-US"/>
-          </a:p>
-        </p:txBody>
-      </p:sp>
-      <p:pic>
-        <p:nvPicPr>
-          <p:cNvPr id="8" name="Picture 7">
-            <a:extLst>
-              <a:ext uri="{FF2B5EF4-FFF2-40B4-BE49-F238E27FC236}">
-                <a16:creationId xmlns:a16="http://schemas.microsoft.com/office/drawing/2014/main" id="{6EB721CE-56DF-4744-AA7F-7D38D3D95B68}"/>
-              </a:ext>
-            </a:extLst>
-          </p:cNvPr>
-          <p:cNvPicPr/>
-          <p:nvPr/>
-        </p:nvPicPr>
-        <p:blipFill rotWithShape="1">
-          <a:blip r:embed="rId2"/>
-          <a:srcRect t="321" r="4" b="4"/>
-          <a:stretch/>
-        </p:blipFill>
-        <p:spPr>
-          <a:xfrm>
-            <a:off x="5977788" y="799352"/>
-            <a:ext cx="5425410" cy="5259296"/>
-          </a:xfrm>
-          <a:prstGeom prst="rect">
-            <a:avLst/>
-          </a:prstGeom>
-        </p:spPr>
-      </p:pic>
-      <p:sp>
-        <p:nvSpPr>
-          <p:cNvPr id="3" name="TextBox 2">
-            <a:extLst>
-              <a:ext uri="{FF2B5EF4-FFF2-40B4-BE49-F238E27FC236}">
-                <a16:creationId xmlns:a16="http://schemas.microsoft.com/office/drawing/2014/main" id="{9CA90A09-4362-4627-9576-C80B36F12989}"/>
-              </a:ext>
-            </a:extLst>
-          </p:cNvPr>
-          <p:cNvSpPr txBox="1"/>
-          <p:nvPr/>
-        </p:nvSpPr>
-        <p:spPr>
-          <a:xfrm>
-            <a:off x="665085" y="3346882"/>
-            <a:ext cx="3684973" cy="646331"/>
-          </a:xfrm>
-          <a:prstGeom prst="rect">
-            <a:avLst/>
-          </a:prstGeom>
-          <a:noFill/>
-        </p:spPr>
-        <p:txBody>
-          <a:bodyPr wrap="square" rtlCol="0">
-            <a:spAutoFit/>
-          </a:bodyPr>
-          <a:lstStyle/>
-          <a:p>
-            <a:r>
-              <a:rPr lang="en-US" dirty="0"/>
-              <a:t>Year vs Movie Count</a:t>
-            </a:r>
-          </a:p>
-          <a:p>
-            <a:endParaRPr lang="en-IN" dirty="0"/>
-          </a:p>
-        </p:txBody>
-      </p:sp>
-    </p:spTree>
-    <p:extLst>
-      <p:ext uri="{BB962C8B-B14F-4D97-AF65-F5344CB8AC3E}">
-        <p14:creationId xmlns:p14="http://schemas.microsoft.com/office/powerpoint/2010/main" val="859547858"/>
       </p:ext>
     </p:extLst>
   </p:cSld>

</xml_diff>